<commit_message>
updating AWS Introduction.pptx and aws-intro-codesnippets.txt.
</commit_message>
<xml_diff>
--- a/aws-intro/AWS Introduction.pptx
+++ b/aws-intro/AWS Introduction.pptx
@@ -5,29 +5,28 @@
     <p:sldMasterId id="2147483660" r:id="rId1"/>
   </p:sldMasterIdLst>
   <p:notesMasterIdLst>
-    <p:notesMasterId r:id="rId22"/>
+    <p:notesMasterId r:id="rId21"/>
   </p:notesMasterIdLst>
   <p:sldIdLst>
     <p:sldId id="256" r:id="rId2"/>
-    <p:sldId id="270" r:id="rId3"/>
-    <p:sldId id="276" r:id="rId4"/>
-    <p:sldId id="257" r:id="rId5"/>
-    <p:sldId id="258" r:id="rId6"/>
-    <p:sldId id="259" r:id="rId7"/>
-    <p:sldId id="260" r:id="rId8"/>
-    <p:sldId id="261" r:id="rId9"/>
-    <p:sldId id="264" r:id="rId10"/>
-    <p:sldId id="263" r:id="rId11"/>
-    <p:sldId id="262" r:id="rId12"/>
-    <p:sldId id="265" r:id="rId13"/>
-    <p:sldId id="266" r:id="rId14"/>
-    <p:sldId id="267" r:id="rId15"/>
-    <p:sldId id="268" r:id="rId16"/>
-    <p:sldId id="269" r:id="rId17"/>
-    <p:sldId id="274" r:id="rId18"/>
-    <p:sldId id="271" r:id="rId19"/>
-    <p:sldId id="272" r:id="rId20"/>
-    <p:sldId id="275" r:id="rId21"/>
+    <p:sldId id="276" r:id="rId3"/>
+    <p:sldId id="257" r:id="rId4"/>
+    <p:sldId id="258" r:id="rId5"/>
+    <p:sldId id="259" r:id="rId6"/>
+    <p:sldId id="260" r:id="rId7"/>
+    <p:sldId id="261" r:id="rId8"/>
+    <p:sldId id="264" r:id="rId9"/>
+    <p:sldId id="263" r:id="rId10"/>
+    <p:sldId id="262" r:id="rId11"/>
+    <p:sldId id="265" r:id="rId12"/>
+    <p:sldId id="266" r:id="rId13"/>
+    <p:sldId id="267" r:id="rId14"/>
+    <p:sldId id="268" r:id="rId15"/>
+    <p:sldId id="269" r:id="rId16"/>
+    <p:sldId id="274" r:id="rId17"/>
+    <p:sldId id="271" r:id="rId18"/>
+    <p:sldId id="272" r:id="rId19"/>
+    <p:sldId id="275" r:id="rId20"/>
   </p:sldIdLst>
   <p:sldSz cx="9144000" cy="6858000" type="screen4x3"/>
   <p:notesSz cx="6858000" cy="9144000"/>
@@ -211,7 +210,7 @@
           <a:p>
             <a:fld id="{1B6676A5-1300-B945-98B1-DD92DDC3A3CB}" type="datetimeFigureOut">
               <a:rPr lang="en-US" smtClean="0"/>
-              <a:t>11/16/12</a:t>
+              <a:t>12/2/12</a:t>
             </a:fld>
             <a:endParaRPr lang="en-US"/>
           </a:p>
@@ -535,13 +534,8 @@
             </a:pPr>
             <a:r>
               <a:rPr lang="en-US" dirty="0" smtClean="0"/>
-              <a:t>Cover Different </a:t>
-            </a:r>
-            <a:r>
-              <a:rPr lang="en-US" dirty="0" smtClean="0"/>
-              <a:t>Sizes</a:t>
-            </a:r>
-            <a:endParaRPr lang="en-US" dirty="0" smtClean="0"/>
+              <a:t>Cover Different Sizes</a:t>
+            </a:r>
           </a:p>
           <a:p>
             <a:pPr marL="171450" indent="-171450">
@@ -632,7 +626,7 @@
           <a:p>
             <a:fld id="{BFB43062-714D-1146-A97F-0D45BD9E7BF0}" type="slidenum">
               <a:rPr lang="en-US" smtClean="0"/>
-              <a:t>6</a:t>
+              <a:t>5</a:t>
             </a:fld>
             <a:endParaRPr lang="en-US"/>
           </a:p>
@@ -716,7 +710,7 @@
           <a:p>
             <a:fld id="{BFB43062-714D-1146-A97F-0D45BD9E7BF0}" type="slidenum">
               <a:rPr lang="en-US" smtClean="0"/>
-              <a:t>7</a:t>
+              <a:t>6</a:t>
             </a:fld>
             <a:endParaRPr lang="en-US"/>
           </a:p>
@@ -813,7 +807,7 @@
           <a:p>
             <a:fld id="{BFB43062-714D-1146-A97F-0D45BD9E7BF0}" type="slidenum">
               <a:rPr lang="en-US" smtClean="0"/>
-              <a:t>13</a:t>
+              <a:t>12</a:t>
             </a:fld>
             <a:endParaRPr lang="en-US"/>
           </a:p>
@@ -897,7 +891,7 @@
           <a:p>
             <a:fld id="{BFB43062-714D-1146-A97F-0D45BD9E7BF0}" type="slidenum">
               <a:rPr lang="en-US" smtClean="0"/>
-              <a:t>17</a:t>
+              <a:t>16</a:t>
             </a:fld>
             <a:endParaRPr lang="en-US"/>
           </a:p>
@@ -989,7 +983,7 @@
           <a:p>
             <a:fld id="{BFB43062-714D-1146-A97F-0D45BD9E7BF0}" type="slidenum">
               <a:rPr lang="en-US" smtClean="0"/>
-              <a:t>18</a:t>
+              <a:t>17</a:t>
             </a:fld>
             <a:endParaRPr lang="en-US"/>
           </a:p>
@@ -1232,7 +1226,7 @@
           <a:p>
             <a:fld id="{7CE38E4D-051A-41E1-86A4-E56916468FD0}" type="datetimeFigureOut">
               <a:rPr lang="en-US" smtClean="0"/>
-              <a:t>11/16/12</a:t>
+              <a:t>12/2/12</a:t>
             </a:fld>
             <a:endParaRPr lang="en-US"/>
           </a:p>
@@ -1566,7 +1560,7 @@
           <a:p>
             <a:fld id="{7CE38E4D-051A-41E1-86A4-E56916468FD0}" type="datetimeFigureOut">
               <a:rPr lang="en-US" smtClean="0"/>
-              <a:t>11/16/12</a:t>
+              <a:t>12/2/12</a:t>
             </a:fld>
             <a:endParaRPr lang="en-US"/>
           </a:p>
@@ -1805,7 +1799,7 @@
           <a:p>
             <a:fld id="{7CE38E4D-051A-41E1-86A4-E56916468FD0}" type="datetimeFigureOut">
               <a:rPr lang="en-US" smtClean="0"/>
-              <a:t>11/16/12</a:t>
+              <a:t>12/2/12</a:t>
             </a:fld>
             <a:endParaRPr lang="en-US"/>
           </a:p>
@@ -2105,7 +2099,7 @@
           <a:p>
             <a:fld id="{7CE38E4D-051A-41E1-86A4-E56916468FD0}" type="datetimeFigureOut">
               <a:rPr lang="en-US" smtClean="0"/>
-              <a:t>11/16/12</a:t>
+              <a:t>12/2/12</a:t>
             </a:fld>
             <a:endParaRPr lang="en-US"/>
           </a:p>
@@ -2321,7 +2315,7 @@
           <a:p>
             <a:fld id="{7CE38E4D-051A-41E1-86A4-E56916468FD0}" type="datetimeFigureOut">
               <a:rPr lang="en-US" smtClean="0"/>
-              <a:t>11/16/12</a:t>
+              <a:t>12/2/12</a:t>
             </a:fld>
             <a:endParaRPr lang="en-US"/>
           </a:p>
@@ -2681,7 +2675,7 @@
           <a:p>
             <a:fld id="{7CE38E4D-051A-41E1-86A4-E56916468FD0}" type="datetimeFigureOut">
               <a:rPr lang="en-US" smtClean="0"/>
-              <a:t>11/16/12</a:t>
+              <a:t>12/2/12</a:t>
             </a:fld>
             <a:endParaRPr lang="en-US"/>
           </a:p>
@@ -2948,7 +2942,7 @@
           <a:p>
             <a:fld id="{7CE38E4D-051A-41E1-86A4-E56916468FD0}" type="datetimeFigureOut">
               <a:rPr lang="en-US" smtClean="0"/>
-              <a:t>11/16/12</a:t>
+              <a:t>12/2/12</a:t>
             </a:fld>
             <a:endParaRPr lang="en-US"/>
           </a:p>
@@ -3038,7 +3032,7 @@
           <a:p>
             <a:fld id="{7CE38E4D-051A-41E1-86A4-E56916468FD0}" type="datetimeFigureOut">
               <a:rPr lang="en-US" smtClean="0"/>
-              <a:t>11/16/12</a:t>
+              <a:t>12/2/12</a:t>
             </a:fld>
             <a:endParaRPr lang="en-US"/>
           </a:p>
@@ -3339,7 +3333,7 @@
           <a:p>
             <a:fld id="{7CE38E4D-051A-41E1-86A4-E56916468FD0}" type="datetimeFigureOut">
               <a:rPr lang="en-US" smtClean="0"/>
-              <a:t>11/16/12</a:t>
+              <a:t>12/2/12</a:t>
             </a:fld>
             <a:endParaRPr lang="en-US"/>
           </a:p>
@@ -3645,7 +3639,7 @@
           <a:p>
             <a:fld id="{7CE38E4D-051A-41E1-86A4-E56916468FD0}" type="datetimeFigureOut">
               <a:rPr lang="en-US" smtClean="0"/>
-              <a:t>11/16/12</a:t>
+              <a:t>12/2/12</a:t>
             </a:fld>
             <a:endParaRPr lang="en-US"/>
           </a:p>
@@ -3925,7 +3919,7 @@
           <a:p>
             <a:fld id="{7CE38E4D-051A-41E1-86A4-E56916468FD0}" type="datetimeFigureOut">
               <a:rPr lang="en-US" smtClean="0"/>
-              <a:t>11/16/12</a:t>
+              <a:t>12/2/12</a:t>
             </a:fld>
             <a:endParaRPr lang="en-US"/>
           </a:p>
@@ -4333,7 +4327,7 @@
           <a:p>
             <a:fld id="{7CE38E4D-051A-41E1-86A4-E56916468FD0}" type="datetimeFigureOut">
               <a:rPr lang="en-US" smtClean="0"/>
-              <a:t>11/16/12</a:t>
+              <a:t>12/2/12</a:t>
             </a:fld>
             <a:endParaRPr lang="en-US"/>
           </a:p>
@@ -4893,7 +4887,7 @@
           <a:p>
             <a:fld id="{7CE38E4D-051A-41E1-86A4-E56916468FD0}" type="datetimeFigureOut">
               <a:rPr lang="en-US" smtClean="0"/>
-              <a:t>11/16/12</a:t>
+              <a:t>12/2/12</a:t>
             </a:fld>
             <a:endParaRPr lang="en-US"/>
           </a:p>
@@ -5041,7 +5035,7 @@
           <a:p>
             <a:fld id="{7CE38E4D-051A-41E1-86A4-E56916468FD0}" type="datetimeFigureOut">
               <a:rPr lang="en-US" smtClean="0"/>
-              <a:t>11/16/12</a:t>
+              <a:t>12/2/12</a:t>
             </a:fld>
             <a:endParaRPr lang="en-US"/>
           </a:p>
@@ -5131,7 +5125,7 @@
           <a:p>
             <a:fld id="{7CE38E4D-051A-41E1-86A4-E56916468FD0}" type="datetimeFigureOut">
               <a:rPr lang="en-US" smtClean="0"/>
-              <a:t>11/16/12</a:t>
+              <a:t>12/2/12</a:t>
             </a:fld>
             <a:endParaRPr lang="en-US"/>
           </a:p>
@@ -5473,7 +5467,7 @@
           <a:p>
             <a:fld id="{7CE38E4D-051A-41E1-86A4-E56916468FD0}" type="datetimeFigureOut">
               <a:rPr lang="en-US" smtClean="0"/>
-              <a:t>11/16/12</a:t>
+              <a:t>12/2/12</a:t>
             </a:fld>
             <a:endParaRPr lang="en-US"/>
           </a:p>
@@ -5682,7 +5676,7 @@
           <a:p>
             <a:fld id="{7CE38E4D-051A-41E1-86A4-E56916468FD0}" type="datetimeFigureOut">
               <a:rPr lang="en-US" smtClean="0"/>
-              <a:t>11/16/12</a:t>
+              <a:t>12/2/12</a:t>
             </a:fld>
             <a:endParaRPr lang="en-US"/>
           </a:p>
@@ -6238,7 +6232,11 @@
           <a:p>
             <a:r>
               <a:rPr lang="en-US" dirty="0" smtClean="0"/>
-              <a:t>Presented By Colin Johnson</a:t>
+              <a:t>Created By </a:t>
+            </a:r>
+            <a:r>
+              <a:rPr lang="en-US" dirty="0" smtClean="0"/>
+              <a:t>Colin Johnson</a:t>
             </a:r>
           </a:p>
           <a:p>
@@ -6267,6 +6265,13 @@
   <p:clrMapOvr>
     <a:masterClrMapping/>
   </p:clrMapOvr>
+  <p:timing>
+    <p:tnLst>
+      <p:par>
+        <p:cTn xmlns:p14="http://schemas.microsoft.com/office/powerpoint/2010/main" id="1" dur="indefinite" restart="never" nodeType="tmRoot"/>
+      </p:par>
+    </p:tnLst>
+  </p:timing>
 </p:sld>
 </file>
 
@@ -6304,7 +6309,19 @@
           <a:p>
             <a:r>
               <a:rPr lang="en-US" dirty="0" smtClean="0"/>
-              <a:t>Bonus: Build a Java Based Application</a:t>
+              <a:t>Build a Dynamic Website, </a:t>
+            </a:r>
+            <a:r>
+              <a:rPr lang="en-US" dirty="0" smtClean="0"/>
+              <a:t>use</a:t>
+            </a:r>
+            <a:r>
+              <a:rPr lang="en-US" dirty="0" smtClean="0"/>
+              <a:t> an Elastic </a:t>
+            </a:r>
+            <a:r>
+              <a:rPr lang="en-US" dirty="0" smtClean="0"/>
+              <a:t>IP</a:t>
             </a:r>
             <a:endParaRPr lang="en-US" dirty="0"/>
           </a:p>
@@ -6322,48 +6339,50 @@
         </p:nvSpPr>
         <p:spPr/>
         <p:txBody>
-          <a:bodyPr/>
-          <a:lstStyle/>
-          <a:p>
-            <a:r>
-              <a:rPr lang="en-US" dirty="0" smtClean="0"/>
-              <a:t>Scripted Install of Tomcat Server and Web App</a:t>
+          <a:bodyPr>
+            <a:normAutofit/>
+          </a:bodyPr>
+          <a:lstStyle/>
+          <a:p>
+            <a:r>
+              <a:rPr lang="en-US" dirty="0" smtClean="0"/>
+              <a:t>Use Script</a:t>
             </a:r>
           </a:p>
           <a:p>
             <a:pPr lvl="1"/>
             <a:r>
-              <a:rPr lang="en-US" dirty="0" smtClean="0"/>
-              <a:t>Modify Previous </a:t>
-            </a:r>
-            <a:r>
               <a:rPr lang="en-US" dirty="0"/>
-              <a:t>S</a:t>
-            </a:r>
-            <a:r>
-              <a:rPr lang="en-US" dirty="0" smtClean="0"/>
-              <a:t>cript </a:t>
+              <a:t>ec2-instance-httpd-</a:t>
+            </a:r>
+            <a:r>
+              <a:rPr lang="en-US" dirty="0" smtClean="0"/>
+              <a:t>dynamic.sh</a:t>
+            </a:r>
+          </a:p>
+          <a:p>
+            <a:r>
+              <a:rPr lang="en-US" dirty="0" smtClean="0"/>
+              <a:t>Add an Elastic IP</a:t>
+            </a:r>
+          </a:p>
+          <a:p>
+            <a:r>
+              <a:rPr lang="en-US" dirty="0" smtClean="0"/>
+              <a:t>EC2 instance now has “Static” IP Address</a:t>
+            </a:r>
+          </a:p>
+          <a:p>
+            <a:r>
+              <a:rPr lang="en-US" dirty="0" smtClean="0"/>
+              <a:t>Configure Route 53</a:t>
             </a:r>
           </a:p>
           <a:p>
             <a:pPr lvl="1"/>
             <a:r>
               <a:rPr lang="en-US" dirty="0" smtClean="0"/>
-              <a:t>Or Use: ec2</a:t>
-            </a:r>
-            <a:r>
-              <a:rPr lang="en-US" dirty="0"/>
-              <a:t>-instance-tomcat-</a:t>
-            </a:r>
-            <a:r>
-              <a:rPr lang="en-US" dirty="0" smtClean="0"/>
-              <a:t>basic.sh</a:t>
-            </a:r>
-          </a:p>
-          <a:p>
-            <a:r>
-              <a:rPr lang="en-US" dirty="0" smtClean="0"/>
-              <a:t>Change Security Group to Allow Port 8080 in from all addresses</a:t>
+              <a:t>Point A Record at Elastic IP Address</a:t>
             </a:r>
           </a:p>
         </p:txBody>
@@ -6371,13 +6390,20 @@
     </p:spTree>
     <p:extLst>
       <p:ext uri="{BB962C8B-B14F-4D97-AF65-F5344CB8AC3E}">
-        <p14:creationId xmlns:p14="http://schemas.microsoft.com/office/powerpoint/2010/main" val="3669543809"/>
+        <p14:creationId xmlns:p14="http://schemas.microsoft.com/office/powerpoint/2010/main" val="2122315786"/>
       </p:ext>
     </p:extLst>
   </p:cSld>
   <p:clrMapOvr>
     <a:masterClrMapping/>
   </p:clrMapOvr>
+  <p:timing>
+    <p:tnLst>
+      <p:par>
+        <p:cTn xmlns:p14="http://schemas.microsoft.com/office/powerpoint/2010/main" id="1" dur="indefinite" restart="never" nodeType="tmRoot"/>
+      </p:par>
+    </p:tnLst>
+  </p:timing>
 </p:sld>
 </file>
 
@@ -6415,7 +6441,7 @@
           <a:p>
             <a:r>
               <a:rPr lang="en-US" dirty="0" smtClean="0"/>
-              <a:t>Build a Dynamic Website, Add Elastic IP</a:t>
+              <a:t>Evaluation of Dynamic Website</a:t>
             </a:r>
             <a:endParaRPr lang="en-US" dirty="0"/>
           </a:p>
@@ -6434,63 +6460,158 @@
         <p:spPr/>
         <p:txBody>
           <a:bodyPr>
-            <a:normAutofit/>
+            <a:normAutofit fontScale="85000" lnSpcReduction="20000"/>
           </a:bodyPr>
           <a:lstStyle/>
           <a:p>
             <a:r>
               <a:rPr lang="en-US" dirty="0" smtClean="0"/>
-              <a:t>Use Script</a:t>
+              <a:t>Good</a:t>
             </a:r>
           </a:p>
           <a:p>
             <a:pPr lvl="1"/>
             <a:r>
-              <a:rPr lang="en-US" dirty="0"/>
-              <a:t>ec2-instance-httpd-</a:t>
-            </a:r>
-            <a:r>
-              <a:rPr lang="en-US" dirty="0" smtClean="0"/>
-              <a:t>dynamic.sh</a:t>
-            </a:r>
-          </a:p>
-          <a:p>
-            <a:r>
-              <a:rPr lang="en-US" dirty="0" smtClean="0"/>
-              <a:t>Add an Elastic IP</a:t>
-            </a:r>
-          </a:p>
-          <a:p>
-            <a:r>
-              <a:rPr lang="en-US" dirty="0" smtClean="0"/>
-              <a:t>EC2 instance now has “Static” IP Address</a:t>
-            </a:r>
-          </a:p>
-          <a:p>
-            <a:r>
-              <a:rPr lang="en-US" dirty="0" smtClean="0"/>
-              <a:t>Configure Route 53</a:t>
+              <a:rPr lang="en-US" dirty="0" smtClean="0">
+                <a:solidFill>
+                  <a:schemeClr val="bg2"/>
+                </a:solidFill>
+              </a:rPr>
+              <a:t>DNS Hostname and Static IP Address</a:t>
             </a:r>
           </a:p>
           <a:p>
             <a:pPr lvl="1"/>
             <a:r>
               <a:rPr lang="en-US" dirty="0" smtClean="0"/>
-              <a:t>Point A Record at Elastic IP Address</a:t>
-            </a:r>
+              <a:t>Easy to Support</a:t>
+            </a:r>
+          </a:p>
+          <a:p>
+            <a:pPr lvl="1"/>
+            <a:r>
+              <a:rPr lang="en-US" dirty="0" smtClean="0"/>
+              <a:t>Low Cost Configuration ($0.02/hour as of 2012-11)</a:t>
+            </a:r>
+          </a:p>
+          <a:p>
+            <a:pPr lvl="1"/>
+            <a:r>
+              <a:rPr lang="en-US" dirty="0" smtClean="0"/>
+              <a:t>Can Be Rebuilt Quickly because of user-data</a:t>
+            </a:r>
+          </a:p>
+          <a:p>
+            <a:r>
+              <a:rPr lang="en-US" dirty="0" smtClean="0"/>
+              <a:t>Bad</a:t>
+            </a:r>
+          </a:p>
+          <a:p>
+            <a:pPr lvl="1"/>
+            <a:r>
+              <a:rPr lang="en-US" dirty="0" smtClean="0">
+                <a:solidFill>
+                  <a:schemeClr val="accent4"/>
+                </a:solidFill>
+              </a:rPr>
+              <a:t>Database on </a:t>
+            </a:r>
+            <a:r>
+              <a:rPr lang="en-US" dirty="0">
+                <a:solidFill>
+                  <a:schemeClr val="accent4"/>
+                </a:solidFill>
+              </a:rPr>
+              <a:t>S</a:t>
+            </a:r>
+            <a:r>
+              <a:rPr lang="en-US" dirty="0" smtClean="0">
+                <a:solidFill>
+                  <a:schemeClr val="accent4"/>
+                </a:solidFill>
+              </a:rPr>
+              <a:t>ame Machine. Database an availability concern and resource concern.</a:t>
+            </a:r>
+          </a:p>
+          <a:p>
+            <a:pPr lvl="1"/>
+            <a:r>
+              <a:rPr lang="en-US" dirty="0" smtClean="0"/>
+              <a:t>Availability is Low</a:t>
+            </a:r>
+          </a:p>
+          <a:p>
+            <a:pPr lvl="2"/>
+            <a:r>
+              <a:rPr lang="en-US" dirty="0" smtClean="0">
+                <a:solidFill>
+                  <a:schemeClr val="tx1"/>
+                </a:solidFill>
+              </a:rPr>
+              <a:t>Amazon Instances are Ephemeral. Instance </a:t>
+            </a:r>
+            <a:r>
+              <a:rPr lang="en-US" i="1" dirty="0" smtClean="0">
+                <a:solidFill>
+                  <a:schemeClr val="tx1"/>
+                </a:solidFill>
+              </a:rPr>
+              <a:t>will</a:t>
+            </a:r>
+            <a:r>
+              <a:rPr lang="en-US" dirty="0" smtClean="0">
+                <a:solidFill>
+                  <a:schemeClr val="tx1"/>
+                </a:solidFill>
+              </a:rPr>
+              <a:t> Fail at Some Point.</a:t>
+            </a:r>
+          </a:p>
+          <a:p>
+            <a:pPr lvl="2"/>
+            <a:r>
+              <a:rPr lang="en-US" dirty="0" smtClean="0"/>
+              <a:t>Instance is in a Single Region and a Single Availability Zone.</a:t>
+            </a:r>
+          </a:p>
+          <a:p>
+            <a:pPr lvl="2"/>
+            <a:r>
+              <a:rPr lang="en-US" dirty="0" smtClean="0"/>
+              <a:t>Changes are Not Persistent if Removed from Service</a:t>
+            </a:r>
+          </a:p>
+          <a:p>
+            <a:pPr lvl="1"/>
+            <a:r>
+              <a:rPr lang="en-US" dirty="0" smtClean="0"/>
+              <a:t>Scalability is Low</a:t>
+            </a:r>
+          </a:p>
+          <a:p>
+            <a:pPr lvl="1"/>
+            <a:endParaRPr lang="en-US" dirty="0"/>
           </a:p>
         </p:txBody>
       </p:sp>
     </p:spTree>
     <p:extLst>
       <p:ext uri="{BB962C8B-B14F-4D97-AF65-F5344CB8AC3E}">
-        <p14:creationId xmlns:p14="http://schemas.microsoft.com/office/powerpoint/2010/main" val="2122315786"/>
+        <p14:creationId xmlns:p14="http://schemas.microsoft.com/office/powerpoint/2010/main" val="654894776"/>
       </p:ext>
     </p:extLst>
   </p:cSld>
   <p:clrMapOvr>
     <a:masterClrMapping/>
   </p:clrMapOvr>
+  <p:timing>
+    <p:tnLst>
+      <p:par>
+        <p:cTn xmlns:p14="http://schemas.microsoft.com/office/powerpoint/2010/main" id="1" dur="indefinite" restart="never" nodeType="tmRoot"/>
+      </p:par>
+    </p:tnLst>
+  </p:timing>
 </p:sld>
 </file>
 
@@ -6528,7 +6649,15 @@
           <a:p>
             <a:r>
               <a:rPr lang="en-US" dirty="0" smtClean="0"/>
-              <a:t>Evaluation of Dynamic Website</a:t>
+              <a:t>Create </a:t>
+            </a:r>
+            <a:r>
+              <a:rPr lang="en-US" dirty="0" smtClean="0"/>
+              <a:t>an RDS </a:t>
+            </a:r>
+            <a:r>
+              <a:rPr lang="en-US" dirty="0" smtClean="0"/>
+              <a:t>Instance</a:t>
             </a:r>
             <a:endParaRPr lang="en-US" dirty="0"/>
           </a:p>
@@ -6547,151 +6676,79 @@
         <p:spPr/>
         <p:txBody>
           <a:bodyPr>
-            <a:normAutofit fontScale="85000" lnSpcReduction="20000"/>
+            <a:normAutofit fontScale="92500" lnSpcReduction="10000"/>
           </a:bodyPr>
           <a:lstStyle/>
           <a:p>
             <a:r>
               <a:rPr lang="en-US" dirty="0" smtClean="0"/>
-              <a:t>Good</a:t>
+              <a:t>Create RDS Instance</a:t>
+            </a:r>
+          </a:p>
+          <a:p>
+            <a:r>
+              <a:rPr lang="en-US" dirty="0" smtClean="0"/>
+              <a:t>Engine</a:t>
             </a:r>
           </a:p>
           <a:p>
             <a:pPr lvl="1"/>
             <a:r>
-              <a:rPr lang="en-US" dirty="0" smtClean="0">
-                <a:solidFill>
-                  <a:schemeClr val="bg2"/>
-                </a:solidFill>
-              </a:rPr>
-              <a:t>DNS Hostname and Static IP Address</a:t>
+              <a:rPr lang="en-US" dirty="0" smtClean="0"/>
+              <a:t>Choose MySQL</a:t>
+            </a:r>
+          </a:p>
+          <a:p>
+            <a:r>
+              <a:rPr lang="en-US" dirty="0" smtClean="0"/>
+              <a:t>RDS Instance Type</a:t>
             </a:r>
           </a:p>
           <a:p>
             <a:pPr lvl="1"/>
             <a:r>
               <a:rPr lang="en-US" dirty="0" smtClean="0"/>
-              <a:t>Easy to Support</a:t>
+              <a:t>Nearly same offerings as EC2 but not at higher-end. Choose t1.micro</a:t>
+            </a:r>
+          </a:p>
+          <a:p>
+            <a:r>
+              <a:rPr lang="en-US" dirty="0" smtClean="0"/>
+              <a:t>Create Security Group</a:t>
             </a:r>
           </a:p>
           <a:p>
             <a:pPr lvl="1"/>
             <a:r>
               <a:rPr lang="en-US" dirty="0" smtClean="0"/>
-              <a:t>Low Cost Configuration ($0.02/hour as of 2012-11)</a:t>
-            </a:r>
-          </a:p>
-          <a:p>
-            <a:pPr lvl="1"/>
-            <a:r>
-              <a:rPr lang="en-US" dirty="0" smtClean="0"/>
-              <a:t>Can Be Rebuilt Quickly because of user-data</a:t>
-            </a:r>
-          </a:p>
-          <a:p>
-            <a:r>
-              <a:rPr lang="en-US" dirty="0" smtClean="0"/>
-              <a:t>Bad</a:t>
-            </a:r>
-          </a:p>
-          <a:p>
-            <a:pPr lvl="1"/>
-            <a:r>
-              <a:rPr lang="en-US" dirty="0" smtClean="0">
-                <a:solidFill>
-                  <a:schemeClr val="accent4"/>
-                </a:solidFill>
-              </a:rPr>
-              <a:t>Database on </a:t>
-            </a:r>
-            <a:r>
-              <a:rPr lang="en-US" dirty="0">
-                <a:solidFill>
-                  <a:schemeClr val="accent4"/>
-                </a:solidFill>
-              </a:rPr>
-              <a:t>S</a:t>
-            </a:r>
-            <a:r>
-              <a:rPr lang="en-US" dirty="0" smtClean="0">
-                <a:solidFill>
-                  <a:schemeClr val="accent4"/>
-                </a:solidFill>
-              </a:rPr>
-              <a:t>ame Machine. Database an availability concern and resource concern.</a:t>
-            </a:r>
-          </a:p>
-          <a:p>
-            <a:pPr lvl="1"/>
-            <a:r>
-              <a:rPr lang="en-US" dirty="0" smtClean="0"/>
-              <a:t>Availability is Low</a:t>
-            </a:r>
-          </a:p>
-          <a:p>
-            <a:pPr lvl="2"/>
-            <a:r>
-              <a:rPr lang="en-US" dirty="0" smtClean="0">
-                <a:solidFill>
-                  <a:schemeClr val="tx1"/>
-                </a:solidFill>
-              </a:rPr>
-              <a:t>Amazon Instances are Ephemeral. Instance </a:t>
-            </a:r>
-            <a:r>
-              <a:rPr lang="en-US" i="1" dirty="0" smtClean="0">
-                <a:solidFill>
-                  <a:schemeClr val="tx1"/>
-                </a:solidFill>
-              </a:rPr>
-              <a:t>will</a:t>
-            </a:r>
-            <a:r>
-              <a:rPr lang="en-US" dirty="0" smtClean="0">
-                <a:solidFill>
-                  <a:schemeClr val="tx1"/>
-                </a:solidFill>
-              </a:rPr>
-              <a:t> Fail at Some Point.</a:t>
-            </a:r>
-          </a:p>
-          <a:p>
-            <a:pPr lvl="2"/>
-            <a:r>
-              <a:rPr lang="en-US" dirty="0" smtClean="0"/>
-              <a:t>Instance is in a Single Region and a Single Availability Zone.</a:t>
-            </a:r>
-          </a:p>
-          <a:p>
-            <a:pPr lvl="2"/>
-            <a:r>
-              <a:rPr lang="en-US" dirty="0" smtClean="0"/>
-              <a:t>Changes are Not Persistent if Removed from Service</a:t>
-            </a:r>
-          </a:p>
-          <a:p>
-            <a:pPr lvl="1"/>
-            <a:r>
-              <a:rPr lang="en-US" dirty="0" smtClean="0"/>
-              <a:t>Scalability is Low</a:t>
-            </a:r>
-          </a:p>
-          <a:p>
-            <a:pPr lvl="1"/>
-            <a:endParaRPr lang="en-US" dirty="0"/>
+              <a:t>Allow Access to EC2 Security Group Containing Previous Instance</a:t>
+            </a:r>
+          </a:p>
+          <a:p>
+            <a:r>
+              <a:rPr lang="en-US" dirty="0" smtClean="0"/>
+              <a:t>Termination Protection: Off</a:t>
+            </a:r>
           </a:p>
         </p:txBody>
       </p:sp>
     </p:spTree>
     <p:extLst>
       <p:ext uri="{BB962C8B-B14F-4D97-AF65-F5344CB8AC3E}">
-        <p14:creationId xmlns:p14="http://schemas.microsoft.com/office/powerpoint/2010/main" val="654894776"/>
+        <p14:creationId xmlns:p14="http://schemas.microsoft.com/office/powerpoint/2010/main" val="2113591962"/>
       </p:ext>
     </p:extLst>
   </p:cSld>
   <p:clrMapOvr>
     <a:masterClrMapping/>
   </p:clrMapOvr>
+  <p:timing>
+    <p:tnLst>
+      <p:par>
+        <p:cTn xmlns:p14="http://schemas.microsoft.com/office/powerpoint/2010/main" id="1" dur="indefinite" restart="never" nodeType="tmRoot"/>
+      </p:par>
+    </p:tnLst>
+  </p:timing>
 </p:sld>
 </file>
 
@@ -6729,7 +6786,15 @@
           <a:p>
             <a:r>
               <a:rPr lang="en-US" dirty="0" smtClean="0"/>
-              <a:t>Create RDS Instance</a:t>
+              <a:t>Modify </a:t>
+            </a:r>
+            <a:r>
+              <a:rPr lang="en-US" dirty="0" smtClean="0"/>
+              <a:t>an RDS </a:t>
+            </a:r>
+            <a:r>
+              <a:rPr lang="en-US" dirty="0" smtClean="0"/>
+              <a:t>Instance</a:t>
             </a:r>
             <a:endParaRPr lang="en-US" dirty="0"/>
           </a:p>
@@ -6747,73 +6812,64 @@
         </p:nvSpPr>
         <p:spPr/>
         <p:txBody>
-          <a:bodyPr>
-            <a:normAutofit fontScale="92500" lnSpcReduction="10000"/>
-          </a:bodyPr>
-          <a:lstStyle/>
-          <a:p>
-            <a:r>
-              <a:rPr lang="en-US" dirty="0" smtClean="0"/>
-              <a:t>Create RDS Instance</a:t>
-            </a:r>
-          </a:p>
-          <a:p>
-            <a:r>
-              <a:rPr lang="en-US" dirty="0" smtClean="0"/>
-              <a:t>Engine</a:t>
+          <a:bodyPr/>
+          <a:lstStyle/>
+          <a:p>
+            <a:r>
+              <a:rPr lang="en-US" dirty="0" smtClean="0"/>
+              <a:t>Change Instance Size</a:t>
             </a:r>
           </a:p>
           <a:p>
             <a:pPr lvl="1"/>
             <a:r>
               <a:rPr lang="en-US" dirty="0" smtClean="0"/>
-              <a:t>Choose MySQL</a:t>
-            </a:r>
-          </a:p>
-          <a:p>
-            <a:r>
-              <a:rPr lang="en-US" dirty="0" smtClean="0"/>
-              <a:t>RDS Instance Type</a:t>
+              <a:t>Change from m1.small to t1.micro</a:t>
             </a:r>
           </a:p>
           <a:p>
             <a:pPr lvl="1"/>
             <a:r>
               <a:rPr lang="en-US" dirty="0" smtClean="0"/>
-              <a:t>Nearly same offerings as EC2 but not at higher-end. Choose t1.micro</a:t>
-            </a:r>
-          </a:p>
-          <a:p>
-            <a:r>
-              <a:rPr lang="en-US" dirty="0" smtClean="0"/>
-              <a:t>Create Security Group</a:t>
+              <a:t>Change from 5 GB Space to 10 GB Space (note: can only go up in size)</a:t>
+            </a:r>
+          </a:p>
+          <a:p>
+            <a:r>
+              <a:rPr lang="en-US" dirty="0" smtClean="0"/>
+              <a:t>Change DB Parameter Group</a:t>
             </a:r>
           </a:p>
           <a:p>
             <a:pPr lvl="1"/>
             <a:r>
               <a:rPr lang="en-US" dirty="0" smtClean="0"/>
-              <a:t>Allow Access to EC2 Security Group Containing Previous Instance</a:t>
-            </a:r>
-          </a:p>
-          <a:p>
-            <a:r>
-              <a:rPr lang="en-US" dirty="0" smtClean="0"/>
-              <a:t>Termination Protection: Off</a:t>
-            </a:r>
+              <a:t>Change “Max Number of Connections to 10”</a:t>
+            </a:r>
+          </a:p>
+          <a:p>
+            <a:pPr lvl="1"/>
+            <a:endParaRPr lang="en-US" dirty="0"/>
           </a:p>
         </p:txBody>
       </p:sp>
     </p:spTree>
     <p:extLst>
       <p:ext uri="{BB962C8B-B14F-4D97-AF65-F5344CB8AC3E}">
-        <p14:creationId xmlns:p14="http://schemas.microsoft.com/office/powerpoint/2010/main" val="2113591962"/>
+        <p14:creationId xmlns:p14="http://schemas.microsoft.com/office/powerpoint/2010/main" val="171762977"/>
       </p:ext>
     </p:extLst>
   </p:cSld>
   <p:clrMapOvr>
     <a:masterClrMapping/>
   </p:clrMapOvr>
+  <p:timing>
+    <p:tnLst>
+      <p:par>
+        <p:cTn xmlns:p14="http://schemas.microsoft.com/office/powerpoint/2010/main" id="1" dur="indefinite" restart="never" nodeType="tmRoot"/>
+      </p:par>
+    </p:tnLst>
+  </p:timing>
 </p:sld>
 </file>
 
@@ -6851,83 +6907,81 @@
           <a:p>
             <a:r>
               <a:rPr lang="en-US" dirty="0" smtClean="0"/>
-              <a:t>Modify </a:t>
-            </a:r>
+              <a:t>Connect </a:t>
+            </a:r>
+            <a:r>
+              <a:rPr lang="en-US" dirty="0" smtClean="0"/>
+              <a:t>an EC2 </a:t>
+            </a:r>
+            <a:r>
+              <a:rPr lang="en-US" dirty="0" smtClean="0"/>
+              <a:t>Instance to RDS</a:t>
+            </a:r>
+            <a:endParaRPr lang="en-US" dirty="0"/>
+          </a:p>
+        </p:txBody>
+      </p:sp>
+      <p:sp>
+        <p:nvSpPr>
+          <p:cNvPr id="3" name="Content Placeholder 2"/>
+          <p:cNvSpPr>
+            <a:spLocks noGrp="1"/>
+          </p:cNvSpPr>
+          <p:nvPr>
+            <p:ph idx="1"/>
+          </p:nvPr>
+        </p:nvSpPr>
+        <p:spPr/>
+        <p:txBody>
+          <a:bodyPr/>
+          <a:lstStyle/>
+          <a:p>
+            <a:r>
+              <a:rPr lang="en-US" dirty="0" smtClean="0"/>
+              <a:t>Migrate Database from EC2 to RDS</a:t>
+            </a:r>
+          </a:p>
+          <a:p>
+            <a:r>
+              <a:rPr lang="en-US" dirty="0" smtClean="0"/>
+              <a:t>Uninstall MySQL</a:t>
+            </a:r>
+          </a:p>
+          <a:p>
+            <a:pPr lvl="1"/>
             <a:r>
               <a:rPr lang="en-US" dirty="0"/>
-              <a:t>RDS </a:t>
-            </a:r>
-            <a:r>
-              <a:rPr lang="en-US" dirty="0" smtClean="0"/>
-              <a:t>Instance</a:t>
-            </a:r>
-            <a:endParaRPr lang="en-US" dirty="0"/>
-          </a:p>
-        </p:txBody>
-      </p:sp>
-      <p:sp>
-        <p:nvSpPr>
-          <p:cNvPr id="3" name="Content Placeholder 2"/>
-          <p:cNvSpPr>
-            <a:spLocks noGrp="1"/>
-          </p:cNvSpPr>
-          <p:nvPr>
-            <p:ph idx="1"/>
-          </p:nvPr>
-        </p:nvSpPr>
-        <p:spPr/>
-        <p:txBody>
-          <a:bodyPr/>
-          <a:lstStyle/>
-          <a:p>
-            <a:r>
-              <a:rPr lang="en-US" dirty="0" smtClean="0"/>
-              <a:t>Change Instance Size</a:t>
-            </a:r>
-          </a:p>
-          <a:p>
-            <a:pPr lvl="1"/>
-            <a:r>
-              <a:rPr lang="en-US" dirty="0" smtClean="0"/>
-              <a:t>Change from m1.small to t1.micro</a:t>
-            </a:r>
-          </a:p>
-          <a:p>
-            <a:pPr lvl="1"/>
-            <a:r>
-              <a:rPr lang="en-US" dirty="0" smtClean="0"/>
-              <a:t>Change from 5 GB Space to 10 GB Space (note: can only go up in size)</a:t>
-            </a:r>
-          </a:p>
-          <a:p>
-            <a:r>
-              <a:rPr lang="en-US" dirty="0" smtClean="0"/>
-              <a:t>Change DB Parameter Group</a:t>
-            </a:r>
-          </a:p>
-          <a:p>
-            <a:pPr lvl="1"/>
-            <a:r>
-              <a:rPr lang="en-US" dirty="0" smtClean="0"/>
-              <a:t>Change “Max Number of Connections to 10”</a:t>
-            </a:r>
-          </a:p>
-          <a:p>
-            <a:pPr lvl="1"/>
-            <a:endParaRPr lang="en-US" dirty="0"/>
+              <a:t>y</a:t>
+            </a:r>
+            <a:r>
+              <a:rPr lang="en-US" dirty="0" smtClean="0"/>
+              <a:t>um –y uninstall </a:t>
+            </a:r>
+            <a:r>
+              <a:rPr lang="en-US" dirty="0" err="1" smtClean="0"/>
+              <a:t>mysql</a:t>
+            </a:r>
+            <a:endParaRPr lang="en-US" dirty="0" smtClean="0"/>
           </a:p>
         </p:txBody>
       </p:sp>
     </p:spTree>
     <p:extLst>
       <p:ext uri="{BB962C8B-B14F-4D97-AF65-F5344CB8AC3E}">
-        <p14:creationId xmlns:p14="http://schemas.microsoft.com/office/powerpoint/2010/main" val="171762977"/>
+        <p14:creationId xmlns:p14="http://schemas.microsoft.com/office/powerpoint/2010/main" val="27883425"/>
       </p:ext>
     </p:extLst>
   </p:cSld>
   <p:clrMapOvr>
     <a:masterClrMapping/>
   </p:clrMapOvr>
+  <p:timing>
+    <p:tnLst>
+      <p:par>
+        <p:cTn xmlns:p14="http://schemas.microsoft.com/office/powerpoint/2010/main" id="1" dur="indefinite" restart="never" nodeType="tmRoot"/>
+      </p:par>
+    </p:tnLst>
+  </p:timing>
 </p:sld>
 </file>
 
@@ -6965,7 +7019,15 @@
           <a:p>
             <a:r>
               <a:rPr lang="en-US" dirty="0" smtClean="0"/>
-              <a:t>Connect EC2 Instance to RDS</a:t>
+              <a:t>Evaluation of </a:t>
+            </a:r>
+            <a:r>
+              <a:rPr lang="en-US" dirty="0" smtClean="0"/>
+              <a:t>a Dynamic </a:t>
+            </a:r>
+            <a:r>
+              <a:rPr lang="en-US" dirty="0" smtClean="0"/>
+              <a:t>Website with RDS</a:t>
             </a:r>
             <a:endParaRPr lang="en-US" dirty="0"/>
           </a:p>
@@ -6983,48 +7045,154 @@
         </p:nvSpPr>
         <p:spPr/>
         <p:txBody>
-          <a:bodyPr/>
-          <a:lstStyle/>
-          <a:p>
-            <a:r>
-              <a:rPr lang="en-US" dirty="0" smtClean="0"/>
-              <a:t>Migrate Database from EC2 to RDS</a:t>
-            </a:r>
-          </a:p>
-          <a:p>
-            <a:r>
-              <a:rPr lang="en-US" dirty="0" smtClean="0"/>
-              <a:t>Uninstall MySQL</a:t>
+          <a:bodyPr>
+            <a:normAutofit fontScale="77500" lnSpcReduction="20000"/>
+          </a:bodyPr>
+          <a:lstStyle/>
+          <a:p>
+            <a:r>
+              <a:rPr lang="en-US" dirty="0" smtClean="0"/>
+              <a:t>Good</a:t>
             </a:r>
           </a:p>
           <a:p>
             <a:pPr lvl="1"/>
             <a:r>
-              <a:rPr lang="en-US" dirty="0"/>
-              <a:t>y</a:t>
-            </a:r>
-            <a:r>
-              <a:rPr lang="en-US" dirty="0" smtClean="0"/>
-              <a:t>um –y uninstall </a:t>
-            </a:r>
-            <a:r>
-              <a:rPr lang="en-US" dirty="0" err="1" smtClean="0"/>
-              <a:t>mysql</a:t>
-            </a:r>
-            <a:endParaRPr lang="en-US" dirty="0" smtClean="0"/>
+              <a:rPr lang="en-US" dirty="0" smtClean="0">
+                <a:solidFill>
+                  <a:schemeClr val="bg2"/>
+                </a:solidFill>
+              </a:rPr>
+              <a:t>Database (and Data) available even if EC2 Instance Fails</a:t>
+            </a:r>
+          </a:p>
+          <a:p>
+            <a:pPr lvl="1"/>
+            <a:r>
+              <a:rPr lang="en-US" dirty="0" smtClean="0">
+                <a:solidFill>
+                  <a:schemeClr val="bg2"/>
+                </a:solidFill>
+              </a:rPr>
+              <a:t>Database scales easily for CPU, Memory, IOPS</a:t>
+            </a:r>
+          </a:p>
+          <a:p>
+            <a:pPr lvl="1"/>
+            <a:r>
+              <a:rPr lang="en-US" dirty="0" smtClean="0">
+                <a:solidFill>
+                  <a:schemeClr val="tx1"/>
+                </a:solidFill>
+              </a:rPr>
+              <a:t>DNS Hostname and Static IP Address</a:t>
+            </a:r>
+          </a:p>
+          <a:p>
+            <a:pPr lvl="1"/>
+            <a:r>
+              <a:rPr lang="en-US" dirty="0" smtClean="0"/>
+              <a:t>Easy to Support</a:t>
+            </a:r>
+          </a:p>
+          <a:p>
+            <a:pPr lvl="1"/>
+            <a:r>
+              <a:rPr lang="en-US" dirty="0" smtClean="0"/>
+              <a:t>Can Be Rebuilt Quickly because of user-data</a:t>
+            </a:r>
+          </a:p>
+          <a:p>
+            <a:r>
+              <a:rPr lang="en-US" dirty="0" smtClean="0"/>
+              <a:t>Bad</a:t>
+            </a:r>
+          </a:p>
+          <a:p>
+            <a:pPr lvl="1"/>
+            <a:r>
+              <a:rPr lang="en-US" dirty="0" smtClean="0"/>
+              <a:t>Cost Higher: EC2 Instance ($0.02 as of 2012-11) and RDS Instance ($0.025 as of 2012-11)</a:t>
+            </a:r>
+          </a:p>
+          <a:p>
+            <a:pPr lvl="1"/>
+            <a:r>
+              <a:rPr lang="en-US" dirty="0" smtClean="0"/>
+              <a:t>Availability is Low</a:t>
+            </a:r>
+          </a:p>
+          <a:p>
+            <a:pPr lvl="2"/>
+            <a:r>
+              <a:rPr lang="en-US" dirty="0" smtClean="0">
+                <a:solidFill>
+                  <a:schemeClr val="tx1"/>
+                </a:solidFill>
+              </a:rPr>
+              <a:t>Amazon Instances are Ephemeral. Instance </a:t>
+            </a:r>
+            <a:r>
+              <a:rPr lang="en-US" i="1" dirty="0" smtClean="0">
+                <a:solidFill>
+                  <a:schemeClr val="tx1"/>
+                </a:solidFill>
+              </a:rPr>
+              <a:t>will</a:t>
+            </a:r>
+            <a:r>
+              <a:rPr lang="en-US" dirty="0" smtClean="0">
+                <a:solidFill>
+                  <a:schemeClr val="tx1"/>
+                </a:solidFill>
+              </a:rPr>
+              <a:t> Fail at Some Point.</a:t>
+            </a:r>
+          </a:p>
+          <a:p>
+            <a:pPr lvl="2"/>
+            <a:r>
+              <a:rPr lang="en-US" dirty="0" smtClean="0"/>
+              <a:t>Instance is in a Single Region and a Single Availability Zone.</a:t>
+            </a:r>
+          </a:p>
+          <a:p>
+            <a:pPr lvl="2"/>
+            <a:r>
+              <a:rPr lang="en-US" dirty="0" smtClean="0"/>
+              <a:t>Changes are Not Persistent if Removed from Service</a:t>
+            </a:r>
+          </a:p>
+          <a:p>
+            <a:pPr lvl="1"/>
+            <a:r>
+              <a:rPr lang="en-US" dirty="0" smtClean="0"/>
+              <a:t>Scalability is Low</a:t>
+            </a:r>
+          </a:p>
+          <a:p>
+            <a:pPr lvl="1"/>
+            <a:endParaRPr lang="en-US" dirty="0"/>
           </a:p>
         </p:txBody>
       </p:sp>
     </p:spTree>
     <p:extLst>
       <p:ext uri="{BB962C8B-B14F-4D97-AF65-F5344CB8AC3E}">
-        <p14:creationId xmlns:p14="http://schemas.microsoft.com/office/powerpoint/2010/main" val="27883425"/>
+        <p14:creationId xmlns:p14="http://schemas.microsoft.com/office/powerpoint/2010/main" val="3316195220"/>
       </p:ext>
     </p:extLst>
   </p:cSld>
   <p:clrMapOvr>
     <a:masterClrMapping/>
   </p:clrMapOvr>
+  <p:timing>
+    <p:tnLst>
+      <p:par>
+        <p:cTn xmlns:p14="http://schemas.microsoft.com/office/powerpoint/2010/main" id="1" dur="indefinite" restart="never" nodeType="tmRoot"/>
+      </p:par>
+    </p:tnLst>
+  </p:timing>
 </p:sld>
 </file>
 
@@ -7062,7 +7230,15 @@
           <a:p>
             <a:r>
               <a:rPr lang="en-US" dirty="0" smtClean="0"/>
-              <a:t>Evaluation of Dynamic Website with RDS</a:t>
+              <a:t>Create </a:t>
+            </a:r>
+            <a:r>
+              <a:rPr lang="en-US" dirty="0" smtClean="0"/>
+              <a:t>an </a:t>
+            </a:r>
+            <a:r>
+              <a:rPr lang="en-US" dirty="0" smtClean="0"/>
+              <a:t>Elastic Load Balancer</a:t>
             </a:r>
             <a:endParaRPr lang="en-US" dirty="0"/>
           </a:p>
@@ -7081,128 +7257,73 @@
         <p:spPr/>
         <p:txBody>
           <a:bodyPr>
-            <a:normAutofit fontScale="77500" lnSpcReduction="20000"/>
+            <a:normAutofit/>
           </a:bodyPr>
           <a:lstStyle/>
           <a:p>
             <a:r>
               <a:rPr lang="en-US" dirty="0" smtClean="0"/>
-              <a:t>Good</a:t>
+              <a:t>An Elastic Load Balancer will Provide</a:t>
             </a:r>
           </a:p>
           <a:p>
             <a:pPr lvl="1"/>
             <a:r>
-              <a:rPr lang="en-US" dirty="0" smtClean="0">
-                <a:solidFill>
-                  <a:schemeClr val="bg2"/>
-                </a:solidFill>
-              </a:rPr>
-              <a:t>Database (and Data) available even if EC2 Instance Fails</a:t>
+              <a:rPr lang="en-US" dirty="0" smtClean="0"/>
+              <a:t>A Means of Distributing Requests Amongst Multiple Instances</a:t>
             </a:r>
           </a:p>
           <a:p>
             <a:pPr lvl="1"/>
             <a:r>
-              <a:rPr lang="en-US" dirty="0" smtClean="0">
-                <a:solidFill>
-                  <a:schemeClr val="bg2"/>
-                </a:solidFill>
-              </a:rPr>
-              <a:t>Database scales easily for CPU, Memory, IOPS</a:t>
+              <a:rPr lang="en-US" dirty="0" smtClean="0"/>
+              <a:t>A Static Endpoint for DNS</a:t>
             </a:r>
           </a:p>
           <a:p>
             <a:pPr lvl="1"/>
             <a:r>
-              <a:rPr lang="en-US" dirty="0" smtClean="0">
-                <a:solidFill>
-                  <a:schemeClr val="tx1"/>
-                </a:solidFill>
-              </a:rPr>
-              <a:t>DNS Hostname and Static IP Address</a:t>
+              <a:rPr lang="en-US" dirty="0" smtClean="0"/>
+              <a:t>Measures for Instance Health, Performance and Load all through </a:t>
+            </a:r>
+            <a:r>
+              <a:rPr lang="en-US" dirty="0" err="1" smtClean="0"/>
+              <a:t>CloudWatch</a:t>
+            </a:r>
+            <a:endParaRPr lang="en-US" dirty="0" smtClean="0"/>
+          </a:p>
+          <a:p>
+            <a:r>
+              <a:rPr lang="en-US" dirty="0" smtClean="0"/>
+              <a:t>Create a Load Balancer</a:t>
             </a:r>
           </a:p>
           <a:p>
             <a:pPr lvl="1"/>
             <a:r>
               <a:rPr lang="en-US" dirty="0" smtClean="0"/>
-              <a:t>Easy to Support</a:t>
+              <a:t>Forward Listener Port 80 to Instance Port 80</a:t>
             </a:r>
           </a:p>
           <a:p>
             <a:pPr lvl="1"/>
             <a:r>
               <a:rPr lang="en-US" dirty="0" smtClean="0"/>
-              <a:t>Can Be Rebuilt Quickly because of user-data</a:t>
-            </a:r>
-          </a:p>
-          <a:p>
-            <a:r>
-              <a:rPr lang="en-US" dirty="0" smtClean="0"/>
-              <a:t>Bad</a:t>
-            </a:r>
-          </a:p>
-          <a:p>
-            <a:pPr lvl="1"/>
-            <a:r>
-              <a:rPr lang="en-US" dirty="0" smtClean="0"/>
-              <a:t>Cost Higher: EC2 Instance ($0.02 as of 2012-11) and RDS Instance ($0.025 as of 2012-11)</a:t>
-            </a:r>
-          </a:p>
-          <a:p>
-            <a:pPr lvl="1"/>
-            <a:r>
-              <a:rPr lang="en-US" dirty="0" smtClean="0"/>
-              <a:t>Availability is Low</a:t>
+              <a:t>Future Discussion</a:t>
             </a:r>
           </a:p>
           <a:p>
             <a:pPr lvl="2"/>
             <a:r>
-              <a:rPr lang="en-US" dirty="0" smtClean="0">
-                <a:solidFill>
-                  <a:schemeClr val="tx1"/>
-                </a:solidFill>
-              </a:rPr>
-              <a:t>Amazon Instances are Ephemeral. Instance </a:t>
-            </a:r>
-            <a:r>
-              <a:rPr lang="en-US" i="1" dirty="0" smtClean="0">
-                <a:solidFill>
-                  <a:schemeClr val="tx1"/>
-                </a:solidFill>
-              </a:rPr>
-              <a:t>will</a:t>
-            </a:r>
-            <a:r>
-              <a:rPr lang="en-US" dirty="0" smtClean="0">
-                <a:solidFill>
-                  <a:schemeClr val="tx1"/>
-                </a:solidFill>
-              </a:rPr>
-              <a:t> Fail at Some Point.</a:t>
+              <a:rPr lang="en-US" dirty="0" smtClean="0"/>
+              <a:t>Decrypting Traffic on ELB (awesome)</a:t>
             </a:r>
           </a:p>
           <a:p>
             <a:pPr lvl="2"/>
             <a:r>
               <a:rPr lang="en-US" dirty="0" smtClean="0"/>
-              <a:t>Instance is in a Single Region and a Single Availability Zone.</a:t>
-            </a:r>
-          </a:p>
-          <a:p>
-            <a:pPr lvl="2"/>
-            <a:r>
-              <a:rPr lang="en-US" dirty="0" smtClean="0"/>
-              <a:t>Changes are Not Persistent if Removed from Service</a:t>
-            </a:r>
-          </a:p>
-          <a:p>
-            <a:pPr lvl="1"/>
-            <a:r>
-              <a:rPr lang="en-US" dirty="0" smtClean="0"/>
-              <a:t>Scalability is Low</a:t>
+              <a:t>Allowing Instance to *only* accept traffic from ELB</a:t>
             </a:r>
           </a:p>
           <a:p>
@@ -7214,13 +7335,20 @@
     </p:spTree>
     <p:extLst>
       <p:ext uri="{BB962C8B-B14F-4D97-AF65-F5344CB8AC3E}">
-        <p14:creationId xmlns:p14="http://schemas.microsoft.com/office/powerpoint/2010/main" val="3316195220"/>
+        <p14:creationId xmlns:p14="http://schemas.microsoft.com/office/powerpoint/2010/main" val="373524116"/>
       </p:ext>
     </p:extLst>
   </p:cSld>
   <p:clrMapOvr>
     <a:masterClrMapping/>
   </p:clrMapOvr>
+  <p:timing>
+    <p:tnLst>
+      <p:par>
+        <p:cTn xmlns:p14="http://schemas.microsoft.com/office/powerpoint/2010/main" id="1" dur="indefinite" restart="never" nodeType="tmRoot"/>
+      </p:par>
+    </p:tnLst>
+  </p:timing>
 </p:sld>
 </file>
 
@@ -7258,7 +7386,15 @@
           <a:p>
             <a:r>
               <a:rPr lang="en-US" dirty="0" smtClean="0"/>
-              <a:t>Create a Elastic Load Balancer</a:t>
+              <a:t>Create </a:t>
+            </a:r>
+            <a:r>
+              <a:rPr lang="en-US" dirty="0" smtClean="0"/>
+              <a:t>an Auto </a:t>
+            </a:r>
+            <a:r>
+              <a:rPr lang="en-US" dirty="0" smtClean="0"/>
+              <a:t>Scaling Group</a:t>
             </a:r>
             <a:endParaRPr lang="en-US" dirty="0"/>
           </a:p>
@@ -7277,77 +7413,158 @@
         <p:spPr/>
         <p:txBody>
           <a:bodyPr>
-            <a:normAutofit/>
+            <a:normAutofit fontScale="85000" lnSpcReduction="10000"/>
           </a:bodyPr>
           <a:lstStyle/>
           <a:p>
             <a:r>
               <a:rPr lang="en-US" dirty="0" smtClean="0"/>
-              <a:t>An Elastic Load Balancer will Provide</a:t>
+              <a:t>Objectives Addressed:</a:t>
             </a:r>
           </a:p>
           <a:p>
             <a:pPr lvl="1"/>
             <a:r>
               <a:rPr lang="en-US" dirty="0" smtClean="0"/>
-              <a:t>A Means of Distributing Requests Amongst Multiple Instances</a:t>
+              <a:t>Scalability (easily scale up), Availability (redundant instances) and Supportability (consistent rebuild of instances)</a:t>
+            </a:r>
+          </a:p>
+          <a:p>
+            <a:r>
+              <a:rPr lang="en-US" dirty="0" smtClean="0"/>
+              <a:t>Create a user-data </a:t>
+            </a:r>
+            <a:r>
+              <a:rPr lang="en-US" dirty="0" smtClean="0"/>
+              <a:t>File</a:t>
+            </a:r>
+          </a:p>
+          <a:p>
+            <a:r>
+              <a:rPr lang="en-US" dirty="0" smtClean="0"/>
+              <a:t>Create launch-configuration (image-id, instance-type, </a:t>
+            </a:r>
+            <a:r>
+              <a:rPr lang="en-US" dirty="0" err="1" smtClean="0"/>
+              <a:t>userdata</a:t>
+            </a:r>
+            <a:r>
+              <a:rPr lang="en-US" dirty="0" smtClean="0"/>
+              <a:t>, security group, key)</a:t>
             </a:r>
           </a:p>
           <a:p>
             <a:pPr lvl="1"/>
             <a:r>
-              <a:rPr lang="en-US" dirty="0" smtClean="0"/>
-              <a:t>A Static Endpoint for DNS</a:t>
-            </a:r>
+              <a:rPr lang="en-US" dirty="0"/>
+              <a:t>as-create-launch-</a:t>
+            </a:r>
+            <a:r>
+              <a:rPr lang="en-US" dirty="0" err="1" smtClean="0"/>
+              <a:t>config</a:t>
+            </a:r>
+            <a:r>
+              <a:rPr lang="en-US" dirty="0" smtClean="0"/>
+              <a:t> --image-</a:t>
+            </a:r>
+            <a:r>
+              <a:rPr lang="en-US" dirty="0"/>
+              <a:t>id ami-</a:t>
+            </a:r>
+            <a:r>
+              <a:rPr lang="en-US" dirty="0" smtClean="0"/>
+              <a:t>2a31bf1a --instance-type m1.small --region us-west-2 --group &lt;your-security-group&gt; --user-data-file /path/to/user-data-</a:t>
+            </a:r>
+            <a:r>
+              <a:rPr lang="en-US" dirty="0" err="1" smtClean="0"/>
+              <a:t>file.txt</a:t>
+            </a:r>
+            <a:r>
+              <a:rPr lang="en-US" dirty="0" smtClean="0"/>
+              <a:t> --key </a:t>
+            </a:r>
+            <a:r>
+              <a:rPr lang="en-US" dirty="0" smtClean="0"/>
+              <a:t>&lt;</a:t>
+            </a:r>
+            <a:r>
+              <a:rPr lang="en-US" dirty="0" smtClean="0"/>
+              <a:t>your-</a:t>
+            </a:r>
+            <a:r>
+              <a:rPr lang="en-US" dirty="0" smtClean="0"/>
+              <a:t>key</a:t>
+            </a:r>
+            <a:r>
+              <a:rPr lang="en-US" dirty="0" smtClean="0"/>
+              <a:t>&gt;</a:t>
+            </a:r>
+          </a:p>
+          <a:p>
+            <a:r>
+              <a:rPr lang="en-US" dirty="0" smtClean="0"/>
+              <a:t>as</a:t>
+            </a:r>
+            <a:r>
+              <a:rPr lang="en-US" dirty="0"/>
+              <a:t>-create-auto-scaling-</a:t>
+            </a:r>
+            <a:r>
+              <a:rPr lang="en-US" dirty="0" smtClean="0"/>
+              <a:t>group (availability zone, </a:t>
+            </a:r>
+            <a:r>
+              <a:rPr lang="en-US" dirty="0"/>
+              <a:t>min-size, max-size, desired-</a:t>
+            </a:r>
+            <a:r>
+              <a:rPr lang="en-US" dirty="0" smtClean="0"/>
+              <a:t>capacity, load balancer, launch configuration)</a:t>
+            </a:r>
+            <a:endParaRPr lang="en-US" dirty="0"/>
           </a:p>
           <a:p>
             <a:pPr lvl="1"/>
             <a:r>
-              <a:rPr lang="en-US" dirty="0" smtClean="0"/>
-              <a:t>Measures for Instance Health, Performance and Load all through </a:t>
+              <a:rPr lang="en-US" dirty="0"/>
+              <a:t>a</a:t>
+            </a:r>
+            <a:r>
+              <a:rPr lang="en-US" dirty="0" smtClean="0"/>
+              <a:t>s-create-auto-scaling-group </a:t>
+            </a:r>
+            <a:r>
+              <a:rPr lang="en-US" dirty="0" smtClean="0"/>
+              <a:t>&lt;</a:t>
+            </a:r>
+            <a:r>
+              <a:rPr lang="en-US" dirty="0" smtClean="0"/>
+              <a:t>your-</a:t>
+            </a:r>
+            <a:r>
+              <a:rPr lang="en-US" dirty="0" smtClean="0"/>
+              <a:t>group-name</a:t>
+            </a:r>
+            <a:r>
+              <a:rPr lang="en-US" dirty="0"/>
+              <a:t>&gt;</a:t>
+            </a:r>
+            <a:r>
+              <a:rPr lang="en-US" dirty="0" smtClean="0"/>
+              <a:t> --availability-zones us-west-2a --min-size 1 --max-size 1 --desired-capacity 1 –load-balancers </a:t>
+            </a:r>
+            <a:r>
+              <a:rPr lang="en-US" dirty="0" smtClean="0"/>
+              <a:t>&lt;your-</a:t>
             </a:r>
             <a:r>
               <a:rPr lang="en-US" dirty="0" err="1" smtClean="0"/>
-              <a:t>CloudWatch</a:t>
-            </a:r>
-            <a:endParaRPr lang="en-US" dirty="0" smtClean="0"/>
-          </a:p>
-          <a:p>
-            <a:r>
-              <a:rPr lang="en-US" dirty="0" smtClean="0"/>
-              <a:t>Create a Load Balancer</a:t>
-            </a:r>
-          </a:p>
-          <a:p>
-            <a:pPr lvl="1"/>
-            <a:r>
-              <a:rPr lang="en-US" dirty="0" smtClean="0"/>
-              <a:t>Forward Listener Port 80 to Instance Port 80</a:t>
-            </a:r>
-          </a:p>
-          <a:p>
-            <a:pPr lvl="1"/>
-            <a:r>
-              <a:rPr lang="en-US" dirty="0" smtClean="0"/>
-              <a:t>Future Discussion</a:t>
-            </a:r>
-          </a:p>
-          <a:p>
-            <a:pPr lvl="2"/>
-            <a:r>
-              <a:rPr lang="en-US" dirty="0" smtClean="0"/>
-              <a:t>Decrypting Traffic on ELB (awesome)</a:t>
-            </a:r>
-          </a:p>
-          <a:p>
-            <a:pPr lvl="2"/>
-            <a:r>
-              <a:rPr lang="en-US" dirty="0" smtClean="0"/>
-              <a:t>Allowing Instance to *only* accept traffic from ELB</a:t>
-            </a:r>
-          </a:p>
-          <a:p>
-            <a:pPr lvl="1"/>
+              <a:t>elb</a:t>
+            </a:r>
+            <a:r>
+              <a:rPr lang="en-US" dirty="0" smtClean="0"/>
+              <a:t>&gt;</a:t>
+            </a:r>
             <a:endParaRPr lang="en-US" dirty="0"/>
           </a:p>
         </p:txBody>
@@ -7355,13 +7572,20 @@
     </p:spTree>
     <p:extLst>
       <p:ext uri="{BB962C8B-B14F-4D97-AF65-F5344CB8AC3E}">
-        <p14:creationId xmlns:p14="http://schemas.microsoft.com/office/powerpoint/2010/main" val="373524116"/>
+        <p14:creationId xmlns:p14="http://schemas.microsoft.com/office/powerpoint/2010/main" val="3938685570"/>
       </p:ext>
     </p:extLst>
   </p:cSld>
   <p:clrMapOvr>
     <a:masterClrMapping/>
   </p:clrMapOvr>
+  <p:timing>
+    <p:tnLst>
+      <p:par>
+        <p:cTn xmlns:p14="http://schemas.microsoft.com/office/powerpoint/2010/main" id="1" dur="indefinite" restart="never" nodeType="tmRoot"/>
+      </p:par>
+    </p:tnLst>
+  </p:timing>
 </p:sld>
 </file>
 
@@ -7399,7 +7623,15 @@
           <a:p>
             <a:r>
               <a:rPr lang="en-US" dirty="0" smtClean="0"/>
-              <a:t>Create Auto Scaling Group</a:t>
+              <a:t>Update </a:t>
+            </a:r>
+            <a:r>
+              <a:rPr lang="en-US" dirty="0" smtClean="0"/>
+              <a:t>an Auto </a:t>
+            </a:r>
+            <a:r>
+              <a:rPr lang="en-US" dirty="0" smtClean="0"/>
+              <a:t>Scaling Group and RDS Instance</a:t>
             </a:r>
             <a:endParaRPr lang="en-US" dirty="0"/>
           </a:p>
@@ -7417,56 +7649,62 @@
         </p:nvSpPr>
         <p:spPr/>
         <p:txBody>
-          <a:bodyPr>
-            <a:normAutofit fontScale="85000" lnSpcReduction="10000"/>
-          </a:bodyPr>
-          <a:lstStyle/>
-          <a:p>
-            <a:r>
-              <a:rPr lang="en-US" dirty="0" smtClean="0"/>
-              <a:t>Objectives Addressed:</a:t>
-            </a:r>
-          </a:p>
+          <a:bodyPr/>
+          <a:lstStyle/>
           <a:p>
             <a:pPr lvl="1"/>
             <a:r>
               <a:rPr lang="en-US" dirty="0" smtClean="0"/>
-              <a:t>Scalability (easily scale up), Availability (redundant instances) and Supportability (consistent rebuild of instances)</a:t>
-            </a:r>
-          </a:p>
-          <a:p>
-            <a:r>
-              <a:rPr lang="en-US" dirty="0" smtClean="0"/>
-              <a:t>Save </a:t>
-            </a:r>
-            <a:r>
-              <a:rPr lang="en-US" dirty="0" err="1" smtClean="0"/>
-              <a:t>userdata</a:t>
-            </a:r>
-            <a:r>
-              <a:rPr lang="en-US" dirty="0" smtClean="0"/>
-              <a:t> File</a:t>
-            </a:r>
-          </a:p>
-          <a:p>
-            <a:r>
-              <a:rPr lang="en-US" dirty="0" smtClean="0"/>
-              <a:t>Create launch-configuration (image-id, instance-type, </a:t>
-            </a:r>
-            <a:r>
-              <a:rPr lang="en-US" dirty="0" err="1" smtClean="0"/>
-              <a:t>userdata</a:t>
-            </a:r>
-            <a:r>
-              <a:rPr lang="en-US" dirty="0" smtClean="0"/>
-              <a:t>, security group, key)</a:t>
+              <a:t>Concept of Availability Zone, Region</a:t>
+            </a:r>
+          </a:p>
+          <a:p>
+            <a:pPr lvl="2"/>
+            <a:r>
+              <a:rPr lang="en-US" dirty="0" smtClean="0"/>
+              <a:t>Amazon Assures </a:t>
             </a:r>
           </a:p>
           <a:p>
             <a:pPr lvl="1"/>
             <a:r>
+              <a:rPr lang="en-US" dirty="0" smtClean="0"/>
+              <a:t>Update Auto Scaling Group for Size, Availability Zones</a:t>
+            </a:r>
+          </a:p>
+          <a:p>
+            <a:pPr lvl="2"/>
+            <a:r>
               <a:rPr lang="en-US" dirty="0"/>
-              <a:t>as-create-launch-</a:t>
+              <a:t>a</a:t>
+            </a:r>
+            <a:r>
+              <a:rPr lang="en-US" dirty="0" smtClean="0"/>
+              <a:t>s-update-auto-scaling-group </a:t>
+            </a:r>
+            <a:r>
+              <a:rPr lang="en-US" dirty="0" smtClean="0"/>
+              <a:t>&lt;your-group-name</a:t>
+            </a:r>
+            <a:r>
+              <a:rPr lang="en-US" dirty="0"/>
+              <a:t>&gt;</a:t>
+            </a:r>
+            <a:r>
+              <a:rPr lang="en-US" dirty="0" smtClean="0"/>
+              <a:t> --max-size 2 --desired-capacity 2 </a:t>
+            </a:r>
+            <a:r>
+              <a:rPr lang="en-US" dirty="0"/>
+              <a:t>--availability-zone us-west-2a, us-west-2b </a:t>
+            </a:r>
+            <a:r>
+              <a:rPr lang="en-US" dirty="0" smtClean="0"/>
+              <a:t>--launch-configuration </a:t>
+            </a:r>
+            <a:r>
+              <a:rPr lang="en-US" dirty="0" smtClean="0"/>
+              <a:t>&lt;your-launch-</a:t>
             </a:r>
             <a:r>
               <a:rPr lang="en-US" dirty="0" err="1" smtClean="0"/>
@@ -7474,54 +7712,7 @@
             </a:r>
             <a:r>
               <a:rPr lang="en-US" dirty="0" smtClean="0"/>
-              <a:t> --image-</a:t>
-            </a:r>
-            <a:r>
-              <a:rPr lang="en-US" dirty="0"/>
-              <a:t>id ami-</a:t>
-            </a:r>
-            <a:r>
-              <a:rPr lang="en-US" dirty="0" smtClean="0"/>
-              <a:t>2a31bf1a --instance-type m1.small --region us-west-2 --group &lt;your-security-group&gt; --user-data-file /path/to/user-data-</a:t>
-            </a:r>
-            <a:r>
-              <a:rPr lang="en-US" dirty="0" err="1" smtClean="0"/>
-              <a:t>file.txt</a:t>
-            </a:r>
-            <a:endParaRPr lang="en-US" dirty="0" smtClean="0"/>
-          </a:p>
-          <a:p>
-            <a:r>
-              <a:rPr lang="en-US" dirty="0" smtClean="0"/>
-              <a:t>as</a:t>
-            </a:r>
-            <a:r>
-              <a:rPr lang="en-US" dirty="0"/>
-              <a:t>-create-auto-scaling-</a:t>
-            </a:r>
-            <a:r>
-              <a:rPr lang="en-US" dirty="0" smtClean="0"/>
-              <a:t>group (availability zone, </a:t>
-            </a:r>
-            <a:r>
-              <a:rPr lang="en-US" dirty="0"/>
-              <a:t>min-size, max-size, desired-</a:t>
-            </a:r>
-            <a:r>
-              <a:rPr lang="en-US" dirty="0" smtClean="0"/>
-              <a:t>capacity, load balancer, launch configuration)</a:t>
-            </a:r>
-            <a:endParaRPr lang="en-US" dirty="0"/>
-          </a:p>
-          <a:p>
-            <a:pPr lvl="1"/>
-            <a:r>
-              <a:rPr lang="en-US" dirty="0"/>
-              <a:t>a</a:t>
-            </a:r>
-            <a:r>
-              <a:rPr lang="en-US" dirty="0" smtClean="0"/>
-              <a:t>s-create-auto-scaling-group --availability-zone us-west-2a --min-size 1 --max-size 1 --desired-capacity 1 –load-balancer</a:t>
+              <a:t>&gt;</a:t>
             </a:r>
             <a:endParaRPr lang="en-US" dirty="0"/>
           </a:p>
@@ -7530,13 +7721,20 @@
     </p:spTree>
     <p:extLst>
       <p:ext uri="{BB962C8B-B14F-4D97-AF65-F5344CB8AC3E}">
-        <p14:creationId xmlns:p14="http://schemas.microsoft.com/office/powerpoint/2010/main" val="3938685570"/>
+        <p14:creationId xmlns:p14="http://schemas.microsoft.com/office/powerpoint/2010/main" val="1698347749"/>
       </p:ext>
     </p:extLst>
   </p:cSld>
   <p:clrMapOvr>
     <a:masterClrMapping/>
   </p:clrMapOvr>
+  <p:timing>
+    <p:tnLst>
+      <p:par>
+        <p:cTn xmlns:p14="http://schemas.microsoft.com/office/powerpoint/2010/main" id="1" dur="indefinite" restart="never" nodeType="tmRoot"/>
+      </p:par>
+    </p:tnLst>
+  </p:timing>
 </p:sld>
 </file>
 
@@ -7574,7 +7772,31 @@
           <a:p>
             <a:r>
               <a:rPr lang="en-US" dirty="0" smtClean="0"/>
-              <a:t>Update Auto Scaling Group and RDS Instance</a:t>
+              <a:t>Evaluation </a:t>
+            </a:r>
+            <a:r>
+              <a:rPr lang="en-US" dirty="0" smtClean="0"/>
+              <a:t>of </a:t>
+            </a:r>
+            <a:r>
+              <a:rPr lang="en-US" dirty="0" smtClean="0"/>
+              <a:t>a Dynamic </a:t>
+            </a:r>
+            <a:r>
+              <a:rPr lang="en-US" dirty="0"/>
+              <a:t>W</a:t>
+            </a:r>
+            <a:r>
+              <a:rPr lang="en-US" dirty="0" smtClean="0"/>
+              <a:t>ebsite </a:t>
+            </a:r>
+            <a:r>
+              <a:rPr lang="en-US" dirty="0" smtClean="0"/>
+              <a:t>with </a:t>
+            </a:r>
+            <a:r>
+              <a:rPr lang="en-US" dirty="0" smtClean="0"/>
+              <a:t>RDS and an Auto Scaling Group</a:t>
             </a:r>
             <a:endParaRPr lang="en-US" dirty="0"/>
           </a:p>
@@ -7592,68 +7814,150 @@
         </p:nvSpPr>
         <p:spPr/>
         <p:txBody>
-          <a:bodyPr/>
-          <a:lstStyle/>
+          <a:bodyPr>
+            <a:normAutofit fontScale="70000" lnSpcReduction="20000"/>
+          </a:bodyPr>
+          <a:lstStyle/>
+          <a:p>
+            <a:r>
+              <a:rPr lang="en-US" dirty="0" smtClean="0"/>
+              <a:t>Good</a:t>
+            </a:r>
+          </a:p>
           <a:p>
             <a:pPr lvl="1"/>
             <a:r>
-              <a:rPr lang="en-US" dirty="0" smtClean="0"/>
-              <a:t>Concept of Availability Zone, Region</a:t>
+              <a:rPr lang="en-US" dirty="0"/>
+              <a:t>Scalability is </a:t>
+            </a:r>
+            <a:r>
+              <a:rPr lang="en-US" dirty="0" smtClean="0"/>
+              <a:t>Good</a:t>
             </a:r>
           </a:p>
           <a:p>
             <a:pPr lvl="2"/>
             <a:r>
               <a:rPr lang="en-US" dirty="0" smtClean="0"/>
-              <a:t>Amazon Assures </a:t>
+              <a:t>Need to Increase Resources? Scale Up</a:t>
             </a:r>
           </a:p>
           <a:p>
             <a:pPr lvl="1"/>
             <a:r>
               <a:rPr lang="en-US" dirty="0" smtClean="0"/>
-              <a:t>Update Auto Scaling Group for Size, Availability Zones</a:t>
+              <a:t>Application Availability is Good</a:t>
             </a:r>
           </a:p>
           <a:p>
             <a:pPr lvl="2"/>
             <a:r>
-              <a:rPr lang="en-US" dirty="0"/>
-              <a:t>a</a:t>
-            </a:r>
-            <a:r>
-              <a:rPr lang="en-US" dirty="0" smtClean="0"/>
-              <a:t>s-update-auto-scaling-group &lt;</a:t>
-            </a:r>
-            <a:r>
-              <a:rPr lang="en-US" dirty="0" err="1" smtClean="0"/>
-              <a:t>groupname</a:t>
-            </a:r>
-            <a:r>
-              <a:rPr lang="en-US" dirty="0"/>
-              <a:t>&gt;</a:t>
-            </a:r>
-            <a:r>
-              <a:rPr lang="en-US" dirty="0" smtClean="0"/>
-              <a:t> --max-size 2 --desired-capacity 2 </a:t>
-            </a:r>
-            <a:r>
-              <a:rPr lang="en-US" dirty="0"/>
-              <a:t>--availability-zone us-west-2a, us-west-2b </a:t>
-            </a:r>
+              <a:rPr lang="en-US" dirty="0" smtClean="0">
+                <a:solidFill>
+                  <a:schemeClr val="bg2"/>
+                </a:solidFill>
+              </a:rPr>
+              <a:t>Application is Multi-AZ but Single Region</a:t>
+            </a:r>
+          </a:p>
+          <a:p>
+            <a:pPr lvl="1"/>
+            <a:r>
+              <a:rPr lang="en-US" dirty="0" smtClean="0">
+                <a:solidFill>
+                  <a:schemeClr val="tx1"/>
+                </a:solidFill>
+              </a:rPr>
+              <a:t>Database scales easily for CPU, Memory, IOPS</a:t>
+            </a:r>
+          </a:p>
+          <a:p>
+            <a:pPr lvl="1"/>
+            <a:r>
+              <a:rPr lang="en-US" dirty="0" smtClean="0">
+                <a:solidFill>
+                  <a:schemeClr val="tx1"/>
+                </a:solidFill>
+              </a:rPr>
+              <a:t>DNS Hostname and Static IP Address</a:t>
+            </a:r>
+          </a:p>
+          <a:p>
+            <a:pPr lvl="1"/>
+            <a:r>
+              <a:rPr lang="en-US" dirty="0" smtClean="0"/>
+              <a:t>Can Be Rebuilt Quickly because of Auto Scaling Group and User-Data</a:t>
+            </a:r>
+          </a:p>
+          <a:p>
+            <a:r>
+              <a:rPr lang="en-US" dirty="0" smtClean="0"/>
+              <a:t>Bad</a:t>
+            </a:r>
+          </a:p>
+          <a:p>
+            <a:pPr lvl="1"/>
+            <a:r>
+              <a:rPr lang="en-US" dirty="0" smtClean="0">
+                <a:solidFill>
+                  <a:schemeClr val="accent4"/>
+                </a:solidFill>
+              </a:rPr>
+              <a:t>Cost Higher: 2x EC2 Instance ($0.02 * 2 as of 2012-11), RDS Instance ($0.025 as of 2012-11) and ELB ($0.025 as of 2012-11)</a:t>
+            </a:r>
+          </a:p>
+          <a:p>
+            <a:pPr lvl="1"/>
+            <a:r>
+              <a:rPr lang="en-US" dirty="0" smtClean="0"/>
+              <a:t>On Instance Data is Not Protected</a:t>
+            </a:r>
+          </a:p>
+          <a:p>
+            <a:pPr lvl="2"/>
+            <a:r>
+              <a:rPr lang="en-US" dirty="0" smtClean="0"/>
+              <a:t>Changes are Not Persistent if Instance Removed from Service</a:t>
+            </a:r>
+          </a:p>
+          <a:p>
+            <a:pPr lvl="1"/>
+            <a:r>
+              <a:rPr lang="en-US" dirty="0" smtClean="0">
+                <a:solidFill>
+                  <a:schemeClr val="accent4"/>
+                </a:solidFill>
+              </a:rPr>
+              <a:t>Scalability Good, but Manual</a:t>
+            </a:r>
+          </a:p>
+          <a:p>
+            <a:pPr lvl="2"/>
+            <a:endParaRPr lang="en-US" dirty="0" smtClean="0"/>
+          </a:p>
+          <a:p>
+            <a:pPr lvl="1"/>
+            <a:endParaRPr lang="en-US" dirty="0"/>
           </a:p>
         </p:txBody>
       </p:sp>
     </p:spTree>
     <p:extLst>
       <p:ext uri="{BB962C8B-B14F-4D97-AF65-F5344CB8AC3E}">
-        <p14:creationId xmlns:p14="http://schemas.microsoft.com/office/powerpoint/2010/main" val="1698347749"/>
+        <p14:creationId xmlns:p14="http://schemas.microsoft.com/office/powerpoint/2010/main" val="2725198016"/>
       </p:ext>
     </p:extLst>
   </p:cSld>
   <p:clrMapOvr>
     <a:masterClrMapping/>
   </p:clrMapOvr>
+  <p:timing>
+    <p:tnLst>
+      <p:par>
+        <p:cTn xmlns:p14="http://schemas.microsoft.com/office/powerpoint/2010/main" id="1" dur="indefinite" restart="never" nodeType="tmRoot"/>
+      </p:par>
+    </p:tnLst>
+  </p:timing>
 </p:sld>
 </file>
 
@@ -7691,7 +7995,7 @@
           <a:p>
             <a:r>
               <a:rPr lang="en-US" dirty="0" smtClean="0"/>
-              <a:t>Who Am I?</a:t>
+              <a:t>Cloud Philosophy (In Progress)</a:t>
             </a:r>
             <a:endParaRPr lang="en-US" dirty="0"/>
           </a:p>
@@ -7714,41 +8018,18 @@
           <a:p>
             <a:r>
               <a:rPr lang="en-US" dirty="0" smtClean="0"/>
-              <a:t>Owner, </a:t>
-            </a:r>
-            <a:r>
-              <a:rPr lang="en-US" dirty="0" err="1" smtClean="0"/>
-              <a:t>CloudAvail</a:t>
-            </a:r>
-            <a:r>
-              <a:rPr lang="en-US" dirty="0" smtClean="0"/>
-              <a:t> Technology Consulting</a:t>
-            </a:r>
-          </a:p>
-          <a:p>
-            <a:r>
-              <a:rPr lang="en-US" dirty="0" smtClean="0"/>
-              <a:t>10+ Years IT Experience, 2+ Years with </a:t>
-            </a:r>
-            <a:r>
-              <a:rPr lang="en-US" dirty="0" smtClean="0"/>
-              <a:t>AWS</a:t>
-            </a:r>
-            <a:endParaRPr lang="en-US" dirty="0" smtClean="0"/>
-          </a:p>
-          <a:p>
-            <a:r>
-              <a:rPr lang="en-US" dirty="0" smtClean="0"/>
-              <a:t>Author of AWS Missing Tools (http://</a:t>
-            </a:r>
-            <a:r>
-              <a:rPr lang="en-US" dirty="0" err="1" smtClean="0"/>
-              <a:t>awsmissingtools.com</a:t>
-            </a:r>
-            <a:r>
-              <a:rPr lang="en-US" dirty="0" smtClean="0"/>
-              <a:t>)</a:t>
-            </a:r>
+              <a:t>Plan </a:t>
+            </a:r>
+            <a:r>
+              <a:rPr lang="en-US" dirty="0" smtClean="0"/>
+              <a:t>for Failure. </a:t>
+            </a:r>
+            <a:r>
+              <a:rPr lang="en-US" i="1" dirty="0" smtClean="0"/>
+              <a:t>Amazon fails. Keep in mind that AWS resources fail. Use multiple AZs, use queues not calls, retry failures.</a:t>
+            </a:r>
+          </a:p>
+          <a:p>
             <a:endParaRPr lang="en-US" dirty="0"/>
           </a:p>
         </p:txBody>
@@ -7756,209 +8037,20 @@
     </p:spTree>
     <p:extLst>
       <p:ext uri="{BB962C8B-B14F-4D97-AF65-F5344CB8AC3E}">
-        <p14:creationId xmlns:p14="http://schemas.microsoft.com/office/powerpoint/2010/main" val="1481131880"/>
+        <p14:creationId xmlns:p14="http://schemas.microsoft.com/office/powerpoint/2010/main" val="186908840"/>
       </p:ext>
     </p:extLst>
   </p:cSld>
   <p:clrMapOvr>
     <a:masterClrMapping/>
   </p:clrMapOvr>
-</p:sld>
-</file>
-
-<file path=ppt/slides/slide20.xml><?xml version="1.0" encoding="utf-8"?>
-<p:sld xmlns:a="http://schemas.openxmlformats.org/drawingml/2006/main" xmlns:r="http://schemas.openxmlformats.org/officeDocument/2006/relationships" xmlns:p="http://schemas.openxmlformats.org/presentationml/2006/main">
-  <p:cSld>
-    <p:spTree>
-      <p:nvGrpSpPr>
-        <p:cNvPr id="1" name=""/>
-        <p:cNvGrpSpPr/>
-        <p:nvPr/>
-      </p:nvGrpSpPr>
-      <p:grpSpPr>
-        <a:xfrm>
-          <a:off x="0" y="0"/>
-          <a:ext cx="0" cy="0"/>
-          <a:chOff x="0" y="0"/>
-          <a:chExt cx="0" cy="0"/>
-        </a:xfrm>
-      </p:grpSpPr>
-      <p:sp>
-        <p:nvSpPr>
-          <p:cNvPr id="2" name="Title 1"/>
-          <p:cNvSpPr>
-            <a:spLocks noGrp="1"/>
-          </p:cNvSpPr>
-          <p:nvPr>
-            <p:ph type="title"/>
-          </p:nvPr>
-        </p:nvSpPr>
-        <p:spPr/>
-        <p:txBody>
-          <a:bodyPr/>
-          <a:lstStyle/>
-          <a:p>
-            <a:r>
-              <a:rPr lang="en-US" dirty="0" err="1" smtClean="0"/>
-              <a:t>Eval</a:t>
-            </a:r>
-            <a:r>
-              <a:rPr lang="en-US" dirty="0" smtClean="0"/>
-              <a:t> of Website with RDS, Auto Scaling</a:t>
-            </a:r>
-            <a:endParaRPr lang="en-US" dirty="0"/>
-          </a:p>
-        </p:txBody>
-      </p:sp>
-      <p:sp>
-        <p:nvSpPr>
-          <p:cNvPr id="3" name="Content Placeholder 2"/>
-          <p:cNvSpPr>
-            <a:spLocks noGrp="1"/>
-          </p:cNvSpPr>
-          <p:nvPr>
-            <p:ph idx="1"/>
-          </p:nvPr>
-        </p:nvSpPr>
-        <p:spPr/>
-        <p:txBody>
-          <a:bodyPr>
-            <a:normAutofit fontScale="70000" lnSpcReduction="20000"/>
-          </a:bodyPr>
-          <a:lstStyle/>
-          <a:p>
-            <a:r>
-              <a:rPr lang="en-US" dirty="0" smtClean="0"/>
-              <a:t>Good</a:t>
-            </a:r>
-          </a:p>
-          <a:p>
-            <a:pPr lvl="1"/>
-            <a:r>
-              <a:rPr lang="en-US" dirty="0"/>
-              <a:t>Scalability is </a:t>
-            </a:r>
-            <a:r>
-              <a:rPr lang="en-US" dirty="0" smtClean="0"/>
-              <a:t>Good</a:t>
-            </a:r>
-          </a:p>
-          <a:p>
-            <a:pPr lvl="2"/>
-            <a:r>
-              <a:rPr lang="en-US" dirty="0" smtClean="0"/>
-              <a:t>Need to Increase Resources? Scale Up</a:t>
-            </a:r>
-          </a:p>
-          <a:p>
-            <a:pPr lvl="1"/>
-            <a:r>
-              <a:rPr lang="en-US" dirty="0" smtClean="0"/>
-              <a:t>Application Availability is Good</a:t>
-            </a:r>
-          </a:p>
-          <a:p>
-            <a:pPr lvl="2"/>
-            <a:r>
-              <a:rPr lang="en-US" dirty="0" smtClean="0">
-                <a:solidFill>
-                  <a:schemeClr val="bg2"/>
-                </a:solidFill>
-              </a:rPr>
-              <a:t>Application is Multi-AZ but Single Region</a:t>
-            </a:r>
-          </a:p>
-          <a:p>
-            <a:pPr lvl="1"/>
-            <a:r>
-              <a:rPr lang="en-US" dirty="0" smtClean="0">
-                <a:solidFill>
-                  <a:schemeClr val="tx1"/>
-                </a:solidFill>
-              </a:rPr>
-              <a:t>Database scales easily for CPU, Memory, IOPS</a:t>
-            </a:r>
-          </a:p>
-          <a:p>
-            <a:pPr lvl="1"/>
-            <a:r>
-              <a:rPr lang="en-US" dirty="0" smtClean="0">
-                <a:solidFill>
-                  <a:schemeClr val="tx1"/>
-                </a:solidFill>
-              </a:rPr>
-              <a:t>DNS Hostname and Static IP Address</a:t>
-            </a:r>
-          </a:p>
-          <a:p>
-            <a:pPr lvl="1"/>
-            <a:r>
-              <a:rPr lang="en-US" dirty="0" smtClean="0"/>
-              <a:t>Can Be Rebuilt Quickly because of Auto Scaling Group and User-Data</a:t>
-            </a:r>
-          </a:p>
-          <a:p>
-            <a:r>
-              <a:rPr lang="en-US" dirty="0" smtClean="0"/>
-              <a:t>Bad</a:t>
-            </a:r>
-          </a:p>
-          <a:p>
-            <a:pPr lvl="1"/>
-            <a:r>
-              <a:rPr lang="en-US" dirty="0" smtClean="0">
-                <a:solidFill>
-                  <a:schemeClr val="accent4"/>
-                </a:solidFill>
-              </a:rPr>
-              <a:t>Cost Higher: 2x EC2 Instance ($0.02 * 2 as of 2012-11), RDS Instance ($0.025 as of 2012-11) and ELB ($0.025 as of 2012-11)</a:t>
-            </a:r>
-          </a:p>
-          <a:p>
-            <a:pPr lvl="1"/>
-            <a:r>
-              <a:rPr lang="en-US" dirty="0" smtClean="0"/>
-              <a:t>On Instance Data is Not Protected</a:t>
-            </a:r>
-          </a:p>
-          <a:p>
-            <a:pPr lvl="2"/>
-            <a:r>
-              <a:rPr lang="en-US" dirty="0" smtClean="0"/>
-              <a:t>Changes are Not Persistent if Instance Removed from Service</a:t>
-            </a:r>
-          </a:p>
-          <a:p>
-            <a:pPr lvl="1"/>
-            <a:r>
-              <a:rPr lang="en-US" dirty="0" smtClean="0">
-                <a:solidFill>
-                  <a:schemeClr val="accent4"/>
-                </a:solidFill>
-              </a:rPr>
-              <a:t>Scalability Good, but Manual</a:t>
-            </a:r>
-          </a:p>
-          <a:p>
-            <a:pPr lvl="2"/>
-            <a:endParaRPr lang="en-US" dirty="0" smtClean="0"/>
-          </a:p>
-          <a:p>
-            <a:pPr lvl="1"/>
-            <a:endParaRPr lang="en-US" dirty="0"/>
-          </a:p>
-        </p:txBody>
-      </p:sp>
-    </p:spTree>
-    <p:extLst>
-      <p:ext uri="{BB962C8B-B14F-4D97-AF65-F5344CB8AC3E}">
-        <p14:creationId xmlns:p14="http://schemas.microsoft.com/office/powerpoint/2010/main" val="2725198016"/>
-      </p:ext>
-    </p:extLst>
-  </p:cSld>
-  <p:clrMapOvr>
-    <a:masterClrMapping/>
-  </p:clrMapOvr>
+  <p:timing>
+    <p:tnLst>
+      <p:par>
+        <p:cTn xmlns:p14="http://schemas.microsoft.com/office/powerpoint/2010/main" id="1" dur="indefinite" restart="never" nodeType="tmRoot"/>
+      </p:par>
+    </p:tnLst>
+  </p:timing>
 </p:sld>
 </file>
 
@@ -7996,7 +8088,7 @@
           <a:p>
             <a:r>
               <a:rPr lang="en-US" dirty="0" smtClean="0"/>
-              <a:t>Cloud Philosophy (In Progress)</a:t>
+              <a:t>Prerequisites</a:t>
             </a:r>
             <a:endParaRPr lang="en-US" dirty="0"/>
           </a:p>
@@ -8019,56 +8111,97 @@
           <a:p>
             <a:r>
               <a:rPr lang="en-US" dirty="0" smtClean="0"/>
-              <a:t>Stay Product Focused. </a:t>
-            </a:r>
+              <a:t>AWS Account</a:t>
+            </a:r>
+          </a:p>
+          <a:p>
+            <a:r>
+              <a:rPr lang="en-US" dirty="0" smtClean="0"/>
+              <a:t>AWS CLI Tools Installed (ec2 </a:t>
+            </a:r>
+            <a:r>
+              <a:rPr lang="en-US" dirty="0" err="1" smtClean="0"/>
+              <a:t>api</a:t>
+            </a:r>
+            <a:r>
+              <a:rPr lang="en-US" dirty="0" smtClean="0"/>
+              <a:t> cli tools, auto scaling cli tools)</a:t>
+            </a:r>
+          </a:p>
+          <a:p>
+            <a:r>
+              <a:rPr lang="en-US" dirty="0" smtClean="0"/>
+              <a:t>Version Control Account (</a:t>
+            </a:r>
+            <a:r>
+              <a:rPr lang="en-US" dirty="0" err="1" smtClean="0"/>
+              <a:t>svn</a:t>
+            </a:r>
+            <a:r>
+              <a:rPr lang="en-US" dirty="0" smtClean="0"/>
+              <a:t>, </a:t>
+            </a:r>
+            <a:r>
+              <a:rPr lang="en-US" dirty="0" err="1" smtClean="0"/>
+              <a:t>git</a:t>
+            </a:r>
+            <a:r>
+              <a:rPr lang="en-US" dirty="0" smtClean="0"/>
+              <a:t>)</a:t>
+            </a:r>
+          </a:p>
+          <a:p>
             <a:r>
               <a:rPr lang="en-US" i="1" dirty="0" smtClean="0"/>
-              <a:t>Use managed </a:t>
-            </a:r>
-            <a:r>
-              <a:rPr lang="en-US" i="1" dirty="0"/>
-              <a:t>i</a:t>
-            </a:r>
+              <a:t>Nice to have</a:t>
+            </a:r>
+            <a:r>
+              <a:rPr lang="en-US" dirty="0" smtClean="0"/>
+              <a:t>: scripting language (bash, </a:t>
+            </a:r>
+            <a:r>
+              <a:rPr lang="en-US" dirty="0" err="1" smtClean="0"/>
+              <a:t>perl</a:t>
+            </a:r>
+            <a:r>
+              <a:rPr lang="en-US" dirty="0" smtClean="0"/>
+              <a:t>, python, ruby) for writing </a:t>
+            </a:r>
+            <a:r>
+              <a:rPr lang="en-US" dirty="0" err="1" smtClean="0"/>
+              <a:t>userdata</a:t>
+            </a:r>
+            <a:endParaRPr lang="en-US" dirty="0"/>
+          </a:p>
+          <a:p>
             <a:r>
               <a:rPr lang="en-US" i="1" dirty="0" smtClean="0"/>
-              <a:t>nfrastructure unless it is a competitive advantage to run your own infrastructure. –Morgan </a:t>
-            </a:r>
-            <a:r>
-              <a:rPr lang="en-US" i="1" dirty="0" err="1" smtClean="0"/>
-              <a:t>Tocker</a:t>
-            </a:r>
-            <a:endParaRPr lang="en-US" i="1" dirty="0" smtClean="0"/>
-          </a:p>
-          <a:p>
-            <a:r>
-              <a:rPr lang="en-US" dirty="0" smtClean="0"/>
-              <a:t>Plan for Failure. </a:t>
-            </a:r>
-            <a:r>
-              <a:rPr lang="en-US" i="1" dirty="0" smtClean="0"/>
-              <a:t>Amazon fails. </a:t>
-            </a:r>
-            <a:r>
-              <a:rPr lang="en-US" i="1" dirty="0" smtClean="0"/>
-              <a:t>Keep in mind that AWS resources fail. Use multiple AZs, use queues not calls, retry failures.</a:t>
-            </a:r>
-            <a:endParaRPr lang="en-US" i="1" dirty="0" smtClean="0"/>
-          </a:p>
-          <a:p>
-            <a:endParaRPr lang="en-US" dirty="0"/>
+              <a:t>Nice to have</a:t>
+            </a:r>
+            <a:r>
+              <a:rPr lang="en-US" dirty="0" smtClean="0"/>
+              <a:t>: familiarity with Linux, Apache or Tomcat, MySQL and PHP or Java</a:t>
+            </a:r>
           </a:p>
         </p:txBody>
       </p:sp>
     </p:spTree>
     <p:extLst>
       <p:ext uri="{BB962C8B-B14F-4D97-AF65-F5344CB8AC3E}">
-        <p14:creationId xmlns:p14="http://schemas.microsoft.com/office/powerpoint/2010/main" val="186908840"/>
+        <p14:creationId xmlns:p14="http://schemas.microsoft.com/office/powerpoint/2010/main" val="829578081"/>
       </p:ext>
     </p:extLst>
   </p:cSld>
   <p:clrMapOvr>
     <a:masterClrMapping/>
   </p:clrMapOvr>
+  <p:timing>
+    <p:tnLst>
+      <p:par>
+        <p:cTn xmlns:p14="http://schemas.microsoft.com/office/powerpoint/2010/main" id="1" dur="indefinite" restart="never" nodeType="tmRoot"/>
+      </p:par>
+    </p:tnLst>
+  </p:timing>
 </p:sld>
 </file>
 
@@ -8106,7 +8239,15 @@
           <a:p>
             <a:r>
               <a:rPr lang="en-US" dirty="0" smtClean="0"/>
-              <a:t>Prerequisites</a:t>
+              <a:t>Objectives, </a:t>
+            </a:r>
+            <a:r>
+              <a:rPr lang="en-US" dirty="0" smtClean="0"/>
+              <a:t>Session </a:t>
+            </a:r>
+            <a:r>
+              <a:rPr lang="en-US" dirty="0" smtClean="0"/>
+              <a:t>1</a:t>
             </a:r>
             <a:endParaRPr lang="en-US" dirty="0"/>
           </a:p>
@@ -8124,77 +8265,90 @@
         </p:nvSpPr>
         <p:spPr/>
         <p:txBody>
-          <a:bodyPr/>
-          <a:lstStyle/>
-          <a:p>
-            <a:r>
-              <a:rPr lang="en-US" dirty="0" smtClean="0"/>
-              <a:t>AWS Account</a:t>
-            </a:r>
-          </a:p>
-          <a:p>
-            <a:r>
-              <a:rPr lang="en-US" dirty="0" smtClean="0"/>
-              <a:t>AWS CLI Tools Installed (ec2 </a:t>
-            </a:r>
+          <a:bodyPr>
+            <a:normAutofit/>
+          </a:bodyPr>
+          <a:lstStyle/>
+          <a:p>
+            <a:r>
+              <a:rPr lang="en-US" dirty="0" smtClean="0"/>
+              <a:t>Concepts</a:t>
+            </a:r>
+          </a:p>
+          <a:p>
+            <a:pPr lvl="1"/>
+            <a:r>
+              <a:rPr lang="en-US" dirty="0" smtClean="0"/>
+              <a:t>Planning for Failure: Availability Zones</a:t>
+            </a:r>
+            <a:r>
+              <a:rPr lang="en-US" dirty="0"/>
+              <a:t> </a:t>
+            </a:r>
+            <a:r>
+              <a:rPr lang="en-US" dirty="0" smtClean="0"/>
+              <a:t>and Regions</a:t>
+            </a:r>
+          </a:p>
+          <a:p>
+            <a:pPr lvl="1"/>
+            <a:r>
+              <a:rPr lang="en-US" dirty="0" smtClean="0"/>
+              <a:t>Scaling “Up or Out” / “Horizontally or Vertically”</a:t>
+            </a:r>
+          </a:p>
+          <a:p>
+            <a:r>
+              <a:rPr lang="en-US" dirty="0" smtClean="0"/>
+              <a:t>Technologies</a:t>
+            </a:r>
+          </a:p>
+          <a:p>
+            <a:pPr lvl="1"/>
+            <a:r>
+              <a:rPr lang="en-US" dirty="0" smtClean="0"/>
+              <a:t>EC2 </a:t>
+            </a:r>
+            <a:r>
+              <a:rPr lang="en-US" dirty="0"/>
+              <a:t>Instances: </a:t>
+            </a:r>
+            <a:r>
+              <a:rPr lang="en-US" dirty="0" smtClean="0"/>
+              <a:t>Keys, Security </a:t>
+            </a:r>
+            <a:r>
+              <a:rPr lang="en-US" dirty="0"/>
+              <a:t>Groups, </a:t>
+            </a:r>
+            <a:r>
+              <a:rPr lang="en-US" dirty="0" smtClean="0"/>
+              <a:t>Elastic IPs, User Data, User Data “Bootstrapping” Instance</a:t>
+            </a:r>
+          </a:p>
+          <a:p>
+            <a:pPr lvl="1"/>
             <a:r>
               <a:rPr lang="en-US" dirty="0" err="1" smtClean="0"/>
-              <a:t>api</a:t>
-            </a:r>
-            <a:r>
-              <a:rPr lang="en-US" dirty="0" smtClean="0"/>
-              <a:t> cli tools, auto scaling cli tools)</a:t>
-            </a:r>
-          </a:p>
-          <a:p>
-            <a:r>
-              <a:rPr lang="en-US" dirty="0" smtClean="0"/>
-              <a:t>Version Control Account (</a:t>
-            </a:r>
-            <a:r>
-              <a:rPr lang="en-US" dirty="0" err="1" smtClean="0"/>
-              <a:t>svn</a:t>
-            </a:r>
-            <a:r>
-              <a:rPr lang="en-US" dirty="0" smtClean="0"/>
-              <a:t>, </a:t>
-            </a:r>
-            <a:r>
-              <a:rPr lang="en-US" dirty="0" err="1" smtClean="0"/>
-              <a:t>git</a:t>
-            </a:r>
-            <a:r>
-              <a:rPr lang="en-US" dirty="0" smtClean="0"/>
-              <a:t>)</a:t>
-            </a:r>
-          </a:p>
-          <a:p>
-            <a:r>
-              <a:rPr lang="en-US" i="1" dirty="0" smtClean="0"/>
-              <a:t>Nice to have</a:t>
-            </a:r>
-            <a:r>
-              <a:rPr lang="en-US" dirty="0" smtClean="0"/>
-              <a:t>: scripting language (bash, </a:t>
-            </a:r>
-            <a:r>
-              <a:rPr lang="en-US" dirty="0" err="1" smtClean="0"/>
-              <a:t>perl</a:t>
-            </a:r>
-            <a:r>
-              <a:rPr lang="en-US" dirty="0" smtClean="0"/>
-              <a:t>, python, ruby) for writing </a:t>
-            </a:r>
-            <a:r>
-              <a:rPr lang="en-US" dirty="0" err="1" smtClean="0"/>
-              <a:t>userdata</a:t>
-            </a:r>
-            <a:endParaRPr lang="en-US" dirty="0"/>
-          </a:p>
-          <a:p>
-            <a:r>
-              <a:rPr lang="en-US" dirty="0" smtClean="0"/>
-              <a:t>Nice to have: familiarity with Linux, Apache or Tomcat, MySQL and PHP or Java</a:t>
+              <a:t>Autoscaling</a:t>
+            </a:r>
+            <a:r>
+              <a:rPr lang="en-US" dirty="0" smtClean="0"/>
+              <a:t> Groups: Manual Scaling, Load Balancers</a:t>
+            </a:r>
+          </a:p>
+          <a:p>
+            <a:pPr lvl="1"/>
+            <a:r>
+              <a:rPr lang="en-US" dirty="0" smtClean="0"/>
+              <a:t>RDS Instances: Scaling (CPU, Memory, Storage), Security Groups</a:t>
+            </a:r>
+          </a:p>
+          <a:p>
+            <a:pPr lvl="1"/>
+            <a:r>
+              <a:rPr lang="en-US" dirty="0" smtClean="0"/>
+              <a:t>Load Balancer: Have Created an ELB</a:t>
             </a:r>
           </a:p>
         </p:txBody>
@@ -8202,13 +8356,20 @@
     </p:spTree>
     <p:extLst>
       <p:ext uri="{BB962C8B-B14F-4D97-AF65-F5344CB8AC3E}">
-        <p14:creationId xmlns:p14="http://schemas.microsoft.com/office/powerpoint/2010/main" val="829578081"/>
+        <p14:creationId xmlns:p14="http://schemas.microsoft.com/office/powerpoint/2010/main" val="852108151"/>
       </p:ext>
     </p:extLst>
   </p:cSld>
   <p:clrMapOvr>
     <a:masterClrMapping/>
   </p:clrMapOvr>
+  <p:timing>
+    <p:tnLst>
+      <p:par>
+        <p:cTn xmlns:p14="http://schemas.microsoft.com/office/powerpoint/2010/main" id="1" dur="indefinite" restart="never" nodeType="tmRoot"/>
+      </p:par>
+    </p:tnLst>
+  </p:timing>
 </p:sld>
 </file>
 
@@ -8246,7 +8407,15 @@
           <a:p>
             <a:r>
               <a:rPr lang="en-US" dirty="0" smtClean="0"/>
-              <a:t>Objectives, Day 1</a:t>
+              <a:t>Create </a:t>
+            </a:r>
+            <a:r>
+              <a:rPr lang="en-US" dirty="0" smtClean="0"/>
+              <a:t>an EC2 </a:t>
+            </a:r>
+            <a:r>
+              <a:rPr lang="en-US" dirty="0" smtClean="0"/>
+              <a:t>Instance</a:t>
             </a:r>
             <a:endParaRPr lang="en-US" dirty="0"/>
           </a:p>
@@ -8265,112 +8434,116 @@
         <p:spPr/>
         <p:txBody>
           <a:bodyPr>
-            <a:normAutofit/>
+            <a:normAutofit fontScale="70000" lnSpcReduction="20000"/>
           </a:bodyPr>
           <a:lstStyle/>
           <a:p>
             <a:r>
               <a:rPr lang="en-US" dirty="0" smtClean="0"/>
-              <a:t>Concepts</a:t>
+              <a:t>Create EC2 Instance</a:t>
             </a:r>
           </a:p>
           <a:p>
             <a:pPr lvl="1"/>
             <a:r>
               <a:rPr lang="en-US" dirty="0" smtClean="0"/>
-              <a:t>Planning for Failure: Availability </a:t>
-            </a:r>
-            <a:r>
-              <a:rPr lang="en-US" dirty="0" smtClean="0"/>
-              <a:t>Zones</a:t>
-            </a:r>
-            <a:r>
-              <a:rPr lang="en-US" dirty="0"/>
-              <a:t> </a:t>
-            </a:r>
-            <a:r>
-              <a:rPr lang="en-US" dirty="0" smtClean="0"/>
-              <a:t>and </a:t>
-            </a:r>
-            <a:r>
-              <a:rPr lang="en-US" dirty="0" smtClean="0"/>
-              <a:t>Regions</a:t>
+              <a:t>What are Instances Types? Different combinations of CPU, Memory, IO.</a:t>
             </a:r>
           </a:p>
           <a:p>
             <a:pPr lvl="1"/>
             <a:r>
               <a:rPr lang="en-US" dirty="0" smtClean="0"/>
-              <a:t>Scaling “Up or Out” / “Horizontally or Vertically”</a:t>
+              <a:t>What is an AMI? Different flavor of OS and installed software.</a:t>
+            </a:r>
+            <a:endParaRPr lang="en-US" i="1" dirty="0" smtClean="0"/>
+          </a:p>
+          <a:p>
+            <a:pPr lvl="1"/>
+            <a:r>
+              <a:rPr lang="en-US" dirty="0" smtClean="0"/>
+              <a:t>What is EBS or Instance Store? </a:t>
+            </a:r>
+            <a:r>
+              <a:rPr lang="en-US" i="1" dirty="0" smtClean="0"/>
+              <a:t>EBS = “Persistent” whereas Instance Store = Ephemeral (won’t survive stop/start)</a:t>
             </a:r>
             <a:endParaRPr lang="en-US" dirty="0" smtClean="0"/>
           </a:p>
           <a:p>
             <a:r>
               <a:rPr lang="en-US" dirty="0" smtClean="0"/>
-              <a:t>Technologies</a:t>
+              <a:t>Create Security Group</a:t>
             </a:r>
           </a:p>
           <a:p>
             <a:pPr lvl="1"/>
             <a:r>
               <a:rPr lang="en-US" dirty="0" smtClean="0"/>
-              <a:t>EC2 </a:t>
-            </a:r>
-            <a:r>
-              <a:rPr lang="en-US" dirty="0"/>
-              <a:t>Instances: </a:t>
-            </a:r>
-            <a:r>
-              <a:rPr lang="en-US" dirty="0" smtClean="0"/>
-              <a:t>Keys, Security </a:t>
-            </a:r>
-            <a:r>
-              <a:rPr lang="en-US" dirty="0"/>
-              <a:t>Groups, </a:t>
-            </a:r>
-            <a:r>
-              <a:rPr lang="en-US" dirty="0" smtClean="0"/>
-              <a:t>Elastic IPs, User Data, User Data “Bootstrapping” Instance</a:t>
+              <a:t>Port 22 open to only </a:t>
+            </a:r>
+            <a:r>
+              <a:rPr lang="en-US" i="1" dirty="0" smtClean="0"/>
+              <a:t>your</a:t>
+            </a:r>
+            <a:r>
+              <a:rPr lang="en-US" dirty="0" smtClean="0"/>
+              <a:t> IP Address</a:t>
             </a:r>
           </a:p>
           <a:p>
             <a:pPr lvl="1"/>
             <a:r>
-              <a:rPr lang="en-US" dirty="0" err="1" smtClean="0"/>
-              <a:t>Autoscaling</a:t>
-            </a:r>
-            <a:r>
-              <a:rPr lang="en-US" dirty="0" smtClean="0"/>
-              <a:t> Groups: Manual Scaling, Load Balancers</a:t>
+              <a:rPr lang="en-US" dirty="0" smtClean="0"/>
+              <a:t>Ports 80 and 8080 open to Everyone</a:t>
+            </a:r>
+          </a:p>
+          <a:p>
+            <a:r>
+              <a:rPr lang="en-US" dirty="0" smtClean="0"/>
+              <a:t>Create Key</a:t>
             </a:r>
           </a:p>
           <a:p>
             <a:pPr lvl="1"/>
             <a:r>
-              <a:rPr lang="en-US" dirty="0" smtClean="0"/>
-              <a:t>RDS Instances: Scaling (CPU, Memory, Storage), Security Groups</a:t>
+              <a:rPr lang="en-US" i="1" dirty="0" smtClean="0"/>
+              <a:t>Save this Key</a:t>
+            </a:r>
+          </a:p>
+          <a:p>
+            <a:r>
+              <a:rPr lang="en-US" dirty="0" smtClean="0"/>
+              <a:t>Termination Protection: Off</a:t>
             </a:r>
           </a:p>
           <a:p>
             <a:pPr lvl="1"/>
             <a:r>
-              <a:rPr lang="en-US" dirty="0" smtClean="0"/>
-              <a:t>Load Balancer: Have Created an ELB</a:t>
-            </a:r>
+              <a:rPr lang="en-US" i="1" dirty="0" smtClean="0"/>
+              <a:t>you should get used to AWS resources being ephemeral</a:t>
+            </a:r>
+            <a:endParaRPr lang="en-US" dirty="0" smtClean="0"/>
           </a:p>
         </p:txBody>
       </p:sp>
     </p:spTree>
     <p:extLst>
       <p:ext uri="{BB962C8B-B14F-4D97-AF65-F5344CB8AC3E}">
-        <p14:creationId xmlns:p14="http://schemas.microsoft.com/office/powerpoint/2010/main" val="852108151"/>
+        <p14:creationId xmlns:p14="http://schemas.microsoft.com/office/powerpoint/2010/main" val="282696015"/>
       </p:ext>
     </p:extLst>
   </p:cSld>
   <p:clrMapOvr>
     <a:masterClrMapping/>
   </p:clrMapOvr>
+  <p:timing>
+    <p:tnLst>
+      <p:par>
+        <p:cTn xmlns:p14="http://schemas.microsoft.com/office/powerpoint/2010/main" id="1" dur="indefinite" restart="never" nodeType="tmRoot"/>
+      </p:par>
+    </p:tnLst>
+  </p:timing>
 </p:sld>
 </file>
 
@@ -8408,7 +8581,23 @@
           <a:p>
             <a:r>
               <a:rPr lang="en-US" dirty="0" smtClean="0"/>
-              <a:t>Create EC2 Instance</a:t>
+              <a:t>Create </a:t>
+            </a:r>
+            <a:r>
+              <a:rPr lang="en-US" dirty="0" smtClean="0"/>
+              <a:t>a Web </a:t>
+            </a:r>
+            <a:r>
+              <a:rPr lang="en-US" dirty="0" smtClean="0"/>
+              <a:t>Server on </a:t>
+            </a:r>
+            <a:r>
+              <a:rPr lang="en-US" dirty="0" smtClean="0"/>
+              <a:t>an EC2 </a:t>
+            </a:r>
+            <a:r>
+              <a:rPr lang="en-US" dirty="0" smtClean="0"/>
+              <a:t>Instance</a:t>
             </a:r>
             <a:endParaRPr lang="en-US" dirty="0"/>
           </a:p>
@@ -8427,117 +8616,83 @@
         <p:spPr/>
         <p:txBody>
           <a:bodyPr>
-            <a:normAutofit fontScale="70000" lnSpcReduction="20000"/>
+            <a:normAutofit/>
           </a:bodyPr>
           <a:lstStyle/>
           <a:p>
             <a:r>
               <a:rPr lang="en-US" dirty="0" smtClean="0"/>
-              <a:t>Create EC2 Instance</a:t>
+              <a:t>Login to EC2 Instance</a:t>
+            </a:r>
+          </a:p>
+          <a:p>
+            <a:r>
+              <a:rPr lang="en-US" dirty="0" smtClean="0"/>
+              <a:t>Install Web /</a:t>
+            </a:r>
+            <a:r>
+              <a:rPr lang="en-US" dirty="0"/>
+              <a:t> </a:t>
+            </a:r>
+            <a:r>
+              <a:rPr lang="en-US" dirty="0" smtClean="0"/>
+              <a:t>Application Server Software (Apache or Tomcat)</a:t>
             </a:r>
           </a:p>
           <a:p>
             <a:pPr lvl="1"/>
             <a:r>
               <a:rPr lang="en-US" dirty="0" smtClean="0"/>
-              <a:t>What are Instances Types</a:t>
-            </a:r>
-            <a:r>
-              <a:rPr lang="en-US" dirty="0" smtClean="0"/>
-              <a:t>? Different combinations of CPU, Memory, IO.</a:t>
+              <a:t>Guided: use commands from ec2</a:t>
+            </a:r>
+            <a:r>
+              <a:rPr lang="en-US" dirty="0"/>
+              <a:t>-instance-httpd-</a:t>
+            </a:r>
+            <a:r>
+              <a:rPr lang="en-US" dirty="0" smtClean="0"/>
+              <a:t>basic.sh as a template</a:t>
             </a:r>
           </a:p>
           <a:p>
             <a:pPr lvl="1"/>
             <a:r>
               <a:rPr lang="en-US" dirty="0" smtClean="0"/>
-              <a:t>What is an AMI? Different flavor of OS and installed software.</a:t>
-            </a:r>
-            <a:endParaRPr lang="en-US" i="1" dirty="0" smtClean="0"/>
+              <a:t>On your own: install apache web server, configure a single static page</a:t>
+            </a:r>
+          </a:p>
+          <a:p>
+            <a:r>
+              <a:rPr lang="en-US" dirty="0" smtClean="0"/>
+              <a:t>Access Web Page hosted on your EC2 Instance</a:t>
+            </a:r>
           </a:p>
           <a:p>
             <a:pPr lvl="1"/>
             <a:r>
               <a:rPr lang="en-US" dirty="0" smtClean="0"/>
-              <a:t>What is EBS </a:t>
-            </a:r>
-            <a:r>
-              <a:rPr lang="en-US" dirty="0" smtClean="0"/>
-              <a:t>or Instance Store? </a:t>
-            </a:r>
-            <a:r>
-              <a:rPr lang="en-US" i="1" dirty="0" smtClean="0"/>
-              <a:t>EBS = “Persistent” whereas Instance Store = Ephemeral (won’t survive stop/start)</a:t>
-            </a:r>
-            <a:endParaRPr lang="en-US" dirty="0" smtClean="0"/>
-          </a:p>
-          <a:p>
-            <a:r>
-              <a:rPr lang="en-US" dirty="0" smtClean="0"/>
-              <a:t>Create Security Group</a:t>
-            </a:r>
-          </a:p>
-          <a:p>
-            <a:pPr lvl="1"/>
-            <a:r>
-              <a:rPr lang="en-US" dirty="0" smtClean="0"/>
-              <a:t>Port 22 open to only </a:t>
-            </a:r>
-            <a:r>
-              <a:rPr lang="en-US" i="1" dirty="0" smtClean="0"/>
-              <a:t>your</a:t>
-            </a:r>
-            <a:r>
-              <a:rPr lang="en-US" dirty="0" smtClean="0"/>
-              <a:t> IP Address</a:t>
-            </a:r>
-          </a:p>
-          <a:p>
-            <a:pPr lvl="1"/>
-            <a:r>
-              <a:rPr lang="en-US" dirty="0" smtClean="0"/>
-              <a:t>Ports 80 and 8080 open to Everyone</a:t>
-            </a:r>
-          </a:p>
-          <a:p>
-            <a:r>
-              <a:rPr lang="en-US" dirty="0" smtClean="0"/>
-              <a:t>Create Key</a:t>
-            </a:r>
-          </a:p>
-          <a:p>
-            <a:pPr lvl="1"/>
-            <a:r>
-              <a:rPr lang="en-US" i="1" dirty="0" smtClean="0"/>
-              <a:t>Save this Key</a:t>
-            </a:r>
-          </a:p>
-          <a:p>
-            <a:r>
-              <a:rPr lang="en-US" dirty="0" smtClean="0"/>
-              <a:t>Termination Protection: Off</a:t>
-            </a:r>
-          </a:p>
-          <a:p>
-            <a:pPr lvl="1"/>
-            <a:r>
-              <a:rPr lang="en-US" i="1" dirty="0" smtClean="0"/>
-              <a:t>you should get used to AWS resources being ephemeral</a:t>
-            </a:r>
-            <a:endParaRPr lang="en-US" dirty="0" smtClean="0"/>
+              <a:t>You have now brought up an instance, performed a software install, started a webserver and confirmed your security group settings are correct.</a:t>
+            </a:r>
           </a:p>
         </p:txBody>
       </p:sp>
     </p:spTree>
     <p:extLst>
       <p:ext uri="{BB962C8B-B14F-4D97-AF65-F5344CB8AC3E}">
-        <p14:creationId xmlns:p14="http://schemas.microsoft.com/office/powerpoint/2010/main" val="282696015"/>
+        <p14:creationId xmlns:p14="http://schemas.microsoft.com/office/powerpoint/2010/main" val="2120295368"/>
       </p:ext>
     </p:extLst>
   </p:cSld>
   <p:clrMapOvr>
     <a:masterClrMapping/>
   </p:clrMapOvr>
+  <p:timing>
+    <p:tnLst>
+      <p:par>
+        <p:cTn xmlns:p14="http://schemas.microsoft.com/office/powerpoint/2010/main" id="1" dur="indefinite" restart="never" nodeType="tmRoot"/>
+      </p:par>
+    </p:tnLst>
+  </p:timing>
 </p:sld>
 </file>
 
@@ -8575,7 +8730,34 @@
           <a:p>
             <a:r>
               <a:rPr lang="en-US" dirty="0" smtClean="0"/>
-              <a:t>Create Web Server on EC2 Instance</a:t>
+              <a:t>Automate Web </a:t>
+            </a:r>
+            <a:r>
+              <a:rPr lang="en-US" dirty="0" smtClean="0"/>
+              <a:t>Server </a:t>
+            </a:r>
+            <a:r>
+              <a:rPr lang="en-US" dirty="0" smtClean="0"/>
+              <a:t>Creation</a:t>
+            </a:r>
+            <a:br>
+              <a:rPr lang="en-US" dirty="0" smtClean="0"/>
+            </a:br>
+            <a:r>
+              <a:rPr lang="en-US" dirty="0" smtClean="0"/>
+              <a:t>(</a:t>
+            </a:r>
+            <a:r>
+              <a:rPr lang="en-US" dirty="0" smtClean="0"/>
+              <a:t>using </a:t>
+            </a:r>
+            <a:r>
+              <a:rPr lang="en-US" dirty="0" smtClean="0"/>
+              <a:t>user-data</a:t>
+            </a:r>
+            <a:r>
+              <a:rPr lang="en-US" dirty="0" smtClean="0"/>
+              <a:t>)	</a:t>
             </a:r>
             <a:endParaRPr lang="en-US" dirty="0"/>
           </a:p>
@@ -8593,87 +8775,78 @@
         </p:nvSpPr>
         <p:spPr/>
         <p:txBody>
-          <a:bodyPr>
-            <a:normAutofit/>
-          </a:bodyPr>
-          <a:lstStyle/>
-          <a:p>
-            <a:r>
-              <a:rPr lang="en-US" dirty="0" smtClean="0"/>
-              <a:t>Login to EC2 Instance</a:t>
-            </a:r>
-          </a:p>
-          <a:p>
-            <a:r>
-              <a:rPr lang="en-US" dirty="0" smtClean="0"/>
-              <a:t>Install Web /</a:t>
-            </a:r>
-            <a:r>
-              <a:rPr lang="en-US" dirty="0"/>
-              <a:t> </a:t>
-            </a:r>
-            <a:r>
-              <a:rPr lang="en-US" dirty="0" smtClean="0"/>
-              <a:t>Application Server Software (Apache or Tomcat)</a:t>
+          <a:bodyPr/>
+          <a:lstStyle/>
+          <a:p>
+            <a:r>
+              <a:rPr lang="en-US" dirty="0" smtClean="0"/>
+              <a:t>Terminate Your Previously Used Instance</a:t>
             </a:r>
           </a:p>
           <a:p>
             <a:pPr lvl="1"/>
             <a:r>
               <a:rPr lang="en-US" dirty="0" smtClean="0"/>
-              <a:t>Guided</a:t>
-            </a:r>
-            <a:r>
-              <a:rPr lang="en-US" dirty="0" smtClean="0"/>
-              <a:t>: use commands from ec2</a:t>
-            </a:r>
-            <a:r>
-              <a:rPr lang="en-US" dirty="0"/>
-              <a:t>-instance-httpd-</a:t>
-            </a:r>
-            <a:r>
-              <a:rPr lang="en-US" dirty="0" smtClean="0"/>
-              <a:t>basic.sh as a template</a:t>
+              <a:t>You should know: you just spend 0.025 </a:t>
+            </a:r>
+            <a:r>
+              <a:rPr lang="en-US" i="1" dirty="0" smtClean="0"/>
+              <a:t>if you used a t1.micro</a:t>
+            </a:r>
+          </a:p>
+          <a:p>
+            <a:r>
+              <a:rPr lang="en-US" dirty="0" smtClean="0"/>
+              <a:t>Create a new EC2 Instance and Configure Automatically!</a:t>
             </a:r>
           </a:p>
           <a:p>
             <a:pPr lvl="1"/>
             <a:r>
               <a:rPr lang="en-US" dirty="0" smtClean="0"/>
-              <a:t>On your own: install apache web server, configure a single static page</a:t>
-            </a:r>
-            <a:endParaRPr lang="en-US" dirty="0" smtClean="0"/>
-          </a:p>
-          <a:p>
-            <a:r>
-              <a:rPr lang="en-US" dirty="0" smtClean="0"/>
-              <a:t>Access Web </a:t>
-            </a:r>
-            <a:r>
-              <a:rPr lang="en-US" dirty="0" smtClean="0"/>
-              <a:t>Page hosted on your EC2 Instance</a:t>
-            </a:r>
-            <a:endParaRPr lang="en-US" dirty="0" smtClean="0"/>
-          </a:p>
-          <a:p>
-            <a:pPr lvl="1"/>
-            <a:r>
-              <a:rPr lang="en-US" dirty="0" smtClean="0"/>
-              <a:t>You have now brought up an instance, performed a software install, started a webserver and confirmed your security group settings are correct.</a:t>
-            </a:r>
+              <a:t>Add from previous Web Server in </a:t>
+            </a:r>
+            <a:r>
+              <a:rPr lang="en-US" dirty="0" err="1" smtClean="0"/>
+              <a:t>userdata</a:t>
+            </a:r>
+            <a:r>
+              <a:rPr lang="en-US" dirty="0" smtClean="0"/>
+              <a:t> field</a:t>
+            </a:r>
+          </a:p>
+          <a:p>
+            <a:r>
+              <a:rPr lang="en-US" dirty="0" smtClean="0"/>
+              <a:t>Create in us-west-2 Region, us-west-2a Availability Zone</a:t>
+            </a:r>
+          </a:p>
+          <a:p>
+            <a:r>
+              <a:rPr lang="en-US" dirty="0" smtClean="0"/>
+              <a:t>Test for Website at EC2 Instance at IP Address</a:t>
+            </a:r>
+            <a:endParaRPr lang="en-US" dirty="0"/>
           </a:p>
         </p:txBody>
       </p:sp>
     </p:spTree>
     <p:extLst>
       <p:ext uri="{BB962C8B-B14F-4D97-AF65-F5344CB8AC3E}">
-        <p14:creationId xmlns:p14="http://schemas.microsoft.com/office/powerpoint/2010/main" val="2120295368"/>
+        <p14:creationId xmlns:p14="http://schemas.microsoft.com/office/powerpoint/2010/main" val="3637905778"/>
       </p:ext>
     </p:extLst>
   </p:cSld>
   <p:clrMapOvr>
     <a:masterClrMapping/>
   </p:clrMapOvr>
+  <p:timing>
+    <p:tnLst>
+      <p:par>
+        <p:cTn xmlns:p14="http://schemas.microsoft.com/office/powerpoint/2010/main" id="1" dur="indefinite" restart="never" nodeType="tmRoot"/>
+      </p:par>
+    </p:tnLst>
+  </p:timing>
 </p:sld>
 </file>
 
@@ -8711,15 +8884,11 @@
           <a:p>
             <a:r>
               <a:rPr lang="en-US" dirty="0" smtClean="0"/>
-              <a:t>Create a Web Server (using </a:t>
-            </a:r>
-            <a:r>
-              <a:rPr lang="en-US" dirty="0" err="1" smtClean="0"/>
-              <a:t>userdata</a:t>
-            </a:r>
-            <a:r>
-              <a:rPr lang="en-US" dirty="0" smtClean="0"/>
-              <a:t>)	</a:t>
+              <a:t>Evaluation </a:t>
+            </a:r>
+            <a:r>
+              <a:rPr lang="en-US" dirty="0" smtClean="0"/>
+              <a:t>of Website Standalone EC2 Instance</a:t>
             </a:r>
             <a:endParaRPr lang="en-US" dirty="0"/>
           </a:p>
@@ -8737,87 +8906,102 @@
         </p:nvSpPr>
         <p:spPr/>
         <p:txBody>
-          <a:bodyPr/>
-          <a:lstStyle/>
-          <a:p>
-            <a:r>
-              <a:rPr lang="en-US" dirty="0" smtClean="0"/>
-              <a:t>Terminate Your Previously Used Instance</a:t>
+          <a:bodyPr>
+            <a:normAutofit fontScale="85000" lnSpcReduction="20000"/>
+          </a:bodyPr>
+          <a:lstStyle/>
+          <a:p>
+            <a:r>
+              <a:rPr lang="en-US" dirty="0" smtClean="0"/>
+              <a:t>Good</a:t>
             </a:r>
           </a:p>
           <a:p>
             <a:pPr lvl="1"/>
             <a:r>
               <a:rPr lang="en-US" dirty="0" smtClean="0"/>
-              <a:t>You </a:t>
-            </a:r>
-            <a:r>
-              <a:rPr lang="en-US" dirty="0" smtClean="0"/>
-              <a:t>should know:</a:t>
-            </a:r>
-            <a:r>
-              <a:rPr lang="en-US" dirty="0" smtClean="0"/>
-              <a:t> </a:t>
-            </a:r>
-            <a:r>
-              <a:rPr lang="en-US" dirty="0" smtClean="0"/>
-              <a:t>you just </a:t>
-            </a:r>
-            <a:r>
-              <a:rPr lang="en-US" dirty="0" smtClean="0"/>
-              <a:t>spend 0.025 </a:t>
+              <a:t>Easy to Support</a:t>
+            </a:r>
+          </a:p>
+          <a:p>
+            <a:pPr lvl="1"/>
+            <a:r>
+              <a:rPr lang="en-US" dirty="0" smtClean="0"/>
+              <a:t>Low Cost Configuration ($0.02/hour as of 2012-11)</a:t>
+            </a:r>
+          </a:p>
+          <a:p>
+            <a:pPr lvl="1"/>
+            <a:r>
+              <a:rPr lang="en-US" dirty="0" smtClean="0"/>
+              <a:t>Can Be Rebuilt Quickly because of user-data</a:t>
+            </a:r>
+          </a:p>
+          <a:p>
+            <a:r>
+              <a:rPr lang="en-US" dirty="0" smtClean="0"/>
+              <a:t>Bad</a:t>
+            </a:r>
+          </a:p>
+          <a:p>
+            <a:pPr lvl="1"/>
+            <a:r>
+              <a:rPr lang="en-US" dirty="0" smtClean="0"/>
+              <a:t>No DNS</a:t>
+            </a:r>
+          </a:p>
+          <a:p>
+            <a:pPr lvl="1"/>
+            <a:r>
+              <a:rPr lang="en-US" dirty="0" smtClean="0"/>
+              <a:t>IP Address is not Static (Can’t Reboot)</a:t>
+            </a:r>
+          </a:p>
+          <a:p>
+            <a:pPr lvl="1"/>
+            <a:r>
+              <a:rPr lang="en-US" dirty="0" smtClean="0"/>
+              <a:t>Availability is Low</a:t>
+            </a:r>
+          </a:p>
+          <a:p>
+            <a:pPr lvl="2"/>
+            <a:r>
+              <a:rPr lang="en-US" dirty="0" smtClean="0"/>
+              <a:t>Amazon Instances are Ephemeral. Instance </a:t>
             </a:r>
             <a:r>
               <a:rPr lang="en-US" i="1" dirty="0" smtClean="0"/>
-              <a:t>if you used a t1.micro</a:t>
-            </a:r>
-          </a:p>
-          <a:p>
-            <a:r>
-              <a:rPr lang="en-US" dirty="0" smtClean="0"/>
-              <a:t>Create </a:t>
-            </a:r>
-            <a:r>
-              <a:rPr lang="en-US" dirty="0" smtClean="0"/>
-              <a:t>a new EC2 </a:t>
-            </a:r>
-            <a:r>
-              <a:rPr lang="en-US" dirty="0" smtClean="0"/>
-              <a:t>Instance and Configur</a:t>
-            </a:r>
-            <a:r>
-              <a:rPr lang="en-US" dirty="0" smtClean="0"/>
-              <a:t>e Automatically!</a:t>
-            </a:r>
-            <a:endParaRPr lang="en-US" dirty="0" smtClean="0"/>
+              <a:t>will</a:t>
+            </a:r>
+            <a:r>
+              <a:rPr lang="en-US" dirty="0" smtClean="0"/>
+              <a:t> Fail at Some Point.</a:t>
+            </a:r>
+          </a:p>
+          <a:p>
+            <a:pPr lvl="2"/>
+            <a:r>
+              <a:rPr lang="en-US" dirty="0" smtClean="0"/>
+              <a:t>Instance is in a Single Region and a Single Availability Zone.</a:t>
+            </a:r>
+          </a:p>
+          <a:p>
+            <a:pPr lvl="2"/>
+            <a:r>
+              <a:rPr lang="en-US" dirty="0" smtClean="0"/>
+              <a:t>Changes are Not Persistent if Removed from Service</a:t>
+            </a:r>
           </a:p>
           <a:p>
             <a:pPr lvl="1"/>
             <a:r>
               <a:rPr lang="en-US" dirty="0" smtClean="0"/>
-              <a:t>Add from previous Web Server in </a:t>
-            </a:r>
-            <a:r>
-              <a:rPr lang="en-US" dirty="0" err="1" smtClean="0"/>
-              <a:t>userdata</a:t>
-            </a:r>
-            <a:r>
-              <a:rPr lang="en-US" dirty="0" smtClean="0"/>
-              <a:t> field</a:t>
-            </a:r>
-            <a:endParaRPr lang="en-US" dirty="0" smtClean="0"/>
-          </a:p>
-          <a:p>
-            <a:r>
-              <a:rPr lang="en-US" dirty="0" smtClean="0"/>
-              <a:t>Create in us-west-2 Region, us-west-2a Availability Zone</a:t>
-            </a:r>
-          </a:p>
-          <a:p>
-            <a:r>
-              <a:rPr lang="en-US" dirty="0" smtClean="0"/>
-              <a:t>Test for Website at EC2 Instance at IP Address</a:t>
-            </a:r>
+              <a:t>Scalability is Low</a:t>
+            </a:r>
+          </a:p>
+          <a:p>
+            <a:pPr lvl="1"/>
             <a:endParaRPr lang="en-US" dirty="0"/>
           </a:p>
         </p:txBody>
@@ -8825,13 +9009,20 @@
     </p:spTree>
     <p:extLst>
       <p:ext uri="{BB962C8B-B14F-4D97-AF65-F5344CB8AC3E}">
-        <p14:creationId xmlns:p14="http://schemas.microsoft.com/office/powerpoint/2010/main" val="3637905778"/>
+        <p14:creationId xmlns:p14="http://schemas.microsoft.com/office/powerpoint/2010/main" val="2708858784"/>
       </p:ext>
     </p:extLst>
   </p:cSld>
   <p:clrMapOvr>
     <a:masterClrMapping/>
   </p:clrMapOvr>
+  <p:timing>
+    <p:tnLst>
+      <p:par>
+        <p:cTn xmlns:p14="http://schemas.microsoft.com/office/powerpoint/2010/main" id="1" dur="indefinite" restart="never" nodeType="tmRoot"/>
+      </p:par>
+    </p:tnLst>
+  </p:timing>
 </p:sld>
 </file>
 
@@ -8868,12 +9059,8 @@
           <a:lstStyle/>
           <a:p>
             <a:r>
-              <a:rPr lang="en-US" dirty="0" err="1" smtClean="0"/>
-              <a:t>Eval</a:t>
-            </a:r>
-            <a:r>
-              <a:rPr lang="en-US" dirty="0" smtClean="0"/>
-              <a:t> of Website Standalone EC2 Instance</a:t>
+              <a:rPr lang="en-US" dirty="0" smtClean="0"/>
+              <a:t>Bonus: Build a Java Based Application</a:t>
             </a:r>
             <a:endParaRPr lang="en-US" dirty="0"/>
           </a:p>
@@ -8891,116 +9078,69 @@
         </p:nvSpPr>
         <p:spPr/>
         <p:txBody>
-          <a:bodyPr>
-            <a:normAutofit fontScale="85000" lnSpcReduction="20000"/>
-          </a:bodyPr>
-          <a:lstStyle/>
-          <a:p>
-            <a:r>
-              <a:rPr lang="en-US" dirty="0" smtClean="0"/>
-              <a:t>Good</a:t>
+          <a:bodyPr/>
+          <a:lstStyle/>
+          <a:p>
+            <a:r>
+              <a:rPr lang="en-US" dirty="0" smtClean="0"/>
+              <a:t>Scripted Install of Tomcat Server and Web App</a:t>
             </a:r>
           </a:p>
           <a:p>
             <a:pPr lvl="1"/>
             <a:r>
               <a:rPr lang="en-US" dirty="0" smtClean="0"/>
-              <a:t>Easy to Support</a:t>
+              <a:t>Modify Previous </a:t>
+            </a:r>
+            <a:r>
+              <a:rPr lang="en-US" dirty="0"/>
+              <a:t>S</a:t>
+            </a:r>
+            <a:r>
+              <a:rPr lang="en-US" dirty="0" smtClean="0"/>
+              <a:t>cript </a:t>
             </a:r>
           </a:p>
           <a:p>
             <a:pPr lvl="1"/>
             <a:r>
               <a:rPr lang="en-US" dirty="0" smtClean="0"/>
-              <a:t>Low Cost Configuration ($0.02/hour as of 2012-11)</a:t>
-            </a:r>
-          </a:p>
-          <a:p>
-            <a:pPr lvl="1"/>
-            <a:r>
-              <a:rPr lang="en-US" dirty="0" smtClean="0"/>
-              <a:t>Can Be Rebuilt Quickly because of user-data</a:t>
-            </a:r>
-          </a:p>
-          <a:p>
-            <a:r>
-              <a:rPr lang="en-US" dirty="0" smtClean="0"/>
-              <a:t>Bad</a:t>
-            </a:r>
-          </a:p>
-          <a:p>
-            <a:pPr lvl="1"/>
-            <a:r>
-              <a:rPr lang="en-US" dirty="0" smtClean="0"/>
-              <a:t>No DNS</a:t>
-            </a:r>
-          </a:p>
-          <a:p>
-            <a:pPr lvl="1"/>
-            <a:r>
-              <a:rPr lang="en-US" dirty="0" smtClean="0"/>
-              <a:t>IP Address is not Static (Can’t Reboot)</a:t>
-            </a:r>
-          </a:p>
-          <a:p>
-            <a:pPr lvl="1"/>
-            <a:r>
-              <a:rPr lang="en-US" dirty="0" smtClean="0"/>
-              <a:t>Availability is Low</a:t>
-            </a:r>
-          </a:p>
-          <a:p>
-            <a:pPr lvl="2"/>
-            <a:r>
-              <a:rPr lang="en-US" dirty="0" smtClean="0"/>
-              <a:t>Amazon Instances are Ephemeral. Instance </a:t>
-            </a:r>
-            <a:r>
-              <a:rPr lang="en-US" i="1" dirty="0" smtClean="0"/>
-              <a:t>will</a:t>
-            </a:r>
-            <a:r>
-              <a:rPr lang="en-US" dirty="0" smtClean="0"/>
-              <a:t> Fail at Some Point.</a:t>
-            </a:r>
-          </a:p>
-          <a:p>
-            <a:pPr lvl="2"/>
-            <a:r>
-              <a:rPr lang="en-US" dirty="0" smtClean="0"/>
-              <a:t>Instance is in a Single Region and a Single Availability Zone.</a:t>
-            </a:r>
-          </a:p>
-          <a:p>
-            <a:pPr lvl="2"/>
-            <a:r>
-              <a:rPr lang="en-US" dirty="0" smtClean="0"/>
-              <a:t>Changes are Not Persistent if Removed from Service</a:t>
-            </a:r>
-          </a:p>
-          <a:p>
-            <a:pPr lvl="1"/>
-            <a:r>
-              <a:rPr lang="en-US" dirty="0" smtClean="0"/>
-              <a:t>Scalability is Low</a:t>
-            </a:r>
-          </a:p>
-          <a:p>
-            <a:pPr lvl="1"/>
-            <a:endParaRPr lang="en-US" dirty="0"/>
+              <a:t>Or Use: ec2</a:t>
+            </a:r>
+            <a:r>
+              <a:rPr lang="en-US" dirty="0"/>
+              <a:t>-instance-tomcat-</a:t>
+            </a:r>
+            <a:r>
+              <a:rPr lang="en-US" dirty="0" smtClean="0"/>
+              <a:t>basic.sh</a:t>
+            </a:r>
+          </a:p>
+          <a:p>
+            <a:r>
+              <a:rPr lang="en-US" dirty="0" smtClean="0"/>
+              <a:t>Change Security Group to Allow Port 8080 in from all addresses</a:t>
+            </a:r>
           </a:p>
         </p:txBody>
       </p:sp>
     </p:spTree>
     <p:extLst>
       <p:ext uri="{BB962C8B-B14F-4D97-AF65-F5344CB8AC3E}">
-        <p14:creationId xmlns:p14="http://schemas.microsoft.com/office/powerpoint/2010/main" val="2708858784"/>
+        <p14:creationId xmlns:p14="http://schemas.microsoft.com/office/powerpoint/2010/main" val="3669543809"/>
       </p:ext>
     </p:extLst>
   </p:cSld>
   <p:clrMapOvr>
     <a:masterClrMapping/>
   </p:clrMapOvr>
+  <p:timing>
+    <p:tnLst>
+      <p:par>
+        <p:cTn xmlns:p14="http://schemas.microsoft.com/office/powerpoint/2010/main" id="1" dur="indefinite" restart="never" nodeType="tmRoot"/>
+      </p:par>
+    </p:tnLst>
+  </p:timing>
 </p:sld>
 </file>
 

</xml_diff>